<commit_message>
Update README.md with minor changes
</commit_message>
<xml_diff>
--- a/Data/Apple_Case_Study_Presentation_VAMSHI_MUGALA.pptx
+++ b/Data/Apple_Case_Study_Presentation_VAMSHI_MUGALA.pptx
@@ -5,15 +5,19 @@
     <p:sldMasterId id="2147483670" r:id="rId1"/>
   </p:sldMasterIdLst>
   <p:notesMasterIdLst>
-    <p:notesMasterId r:id="rId8"/>
+    <p:notesMasterId r:id="rId12"/>
   </p:notesMasterIdLst>
   <p:sldIdLst>
     <p:sldId id="256" r:id="rId2"/>
     <p:sldId id="259" r:id="rId3"/>
     <p:sldId id="298" r:id="rId4"/>
     <p:sldId id="297" r:id="rId5"/>
-    <p:sldId id="310" r:id="rId6"/>
-    <p:sldId id="267" r:id="rId7"/>
+    <p:sldId id="311" r:id="rId6"/>
+    <p:sldId id="314" r:id="rId7"/>
+    <p:sldId id="310" r:id="rId8"/>
+    <p:sldId id="312" r:id="rId9"/>
+    <p:sldId id="313" r:id="rId10"/>
+    <p:sldId id="267" r:id="rId11"/>
   </p:sldIdLst>
   <p:sldSz cx="9144000" cy="5143500" type="screen16x9"/>
   <p:notesSz cx="6858000" cy="9144000"/>
@@ -970,6 +974,120 @@
 </file>
 
 <file path=ppt/notesSlides/notesSlide4.xml><?xml version="1.0" encoding="utf-8"?>
+<p:notes xmlns:a="http://schemas.openxmlformats.org/drawingml/2006/main" xmlns:r="http://schemas.openxmlformats.org/officeDocument/2006/relationships" xmlns:p="http://schemas.openxmlformats.org/presentationml/2006/main">
+  <p:cSld>
+    <p:spTree>
+      <p:nvGrpSpPr>
+        <p:cNvPr id="1" name=""/>
+        <p:cNvGrpSpPr/>
+        <p:nvPr/>
+      </p:nvGrpSpPr>
+      <p:grpSpPr>
+        <a:xfrm>
+          <a:off x="0" y="0"/>
+          <a:ext cx="0" cy="0"/>
+          <a:chOff x="0" y="0"/>
+          <a:chExt cx="0" cy="0"/>
+        </a:xfrm>
+      </p:grpSpPr>
+      <p:sp>
+        <p:nvSpPr>
+          <p:cNvPr id="2" name="Slide Image Placeholder 1"/>
+          <p:cNvSpPr>
+            <a:spLocks noGrp="1" noRot="1" noChangeAspect="1"/>
+          </p:cNvSpPr>
+          <p:nvPr>
+            <p:ph type="sldImg"/>
+          </p:nvPr>
+        </p:nvSpPr>
+        <p:spPr>
+          <a:xfrm>
+            <a:off x="381000" y="685800"/>
+            <a:ext cx="6096000" cy="3429000"/>
+          </a:xfrm>
+        </p:spPr>
+      </p:sp>
+      <p:sp>
+        <p:nvSpPr>
+          <p:cNvPr id="3" name="Notes Placeholder 2"/>
+          <p:cNvSpPr>
+            <a:spLocks noGrp="1"/>
+          </p:cNvSpPr>
+          <p:nvPr>
+            <p:ph type="body" idx="1"/>
+          </p:nvPr>
+        </p:nvSpPr>
+        <p:spPr/>
+        <p:txBody>
+          <a:bodyPr/>
+          <a:lstStyle/>
+          <a:p>
+            <a:pPr marL="158750" indent="0">
+              <a:buNone/>
+            </a:pPr>
+            <a:r>
+              <a:rPr lang="en-US" b="1" dirty="0"/>
+              <a:t>Average Sales Lift per City:</a:t>
+            </a:r>
+          </a:p>
+          <a:p>
+            <a:pPr marL="158750" indent="0">
+              <a:buFont typeface="Arial" panose="020B0604020202020204" pitchFamily="34" charset="0"/>
+              <a:buNone/>
+            </a:pPr>
+            <a:r>
+              <a:rPr lang="en-US" b="1" dirty="0"/>
+              <a:t>City 2</a:t>
+            </a:r>
+            <a:r>
+              <a:rPr lang="en-US" dirty="0"/>
+              <a:t>: Average sales lift of approximately (66.24% increase).</a:t>
+            </a:r>
+          </a:p>
+          <a:p>
+            <a:pPr marL="158750" indent="0">
+              <a:buFont typeface="Arial" panose="020B0604020202020204" pitchFamily="34" charset="0"/>
+              <a:buNone/>
+            </a:pPr>
+            <a:r>
+              <a:rPr lang="en-US" b="1" dirty="0"/>
+              <a:t>City 3</a:t>
+            </a:r>
+            <a:r>
+              <a:rPr lang="en-US" dirty="0"/>
+              <a:t>:(52.34% increase).</a:t>
+            </a:r>
+          </a:p>
+          <a:p>
+            <a:pPr marL="158750" indent="0">
+              <a:buFont typeface="Arial" panose="020B0604020202020204" pitchFamily="34" charset="0"/>
+              <a:buNone/>
+            </a:pPr>
+            <a:r>
+              <a:rPr lang="en-US" b="1" dirty="0"/>
+              <a:t>City 4</a:t>
+            </a:r>
+            <a:r>
+              <a:rPr lang="en-US" dirty="0"/>
+              <a:t>:(25.68% increase)</a:t>
+            </a:r>
+          </a:p>
+        </p:txBody>
+      </p:sp>
+    </p:spTree>
+    <p:extLst>
+      <p:ext uri="{BB962C8B-B14F-4D97-AF65-F5344CB8AC3E}">
+        <p14:creationId xmlns:p14="http://schemas.microsoft.com/office/powerpoint/2010/main" val="2448454305"/>
+      </p:ext>
+    </p:extLst>
+  </p:cSld>
+  <p:clrMapOvr>
+    <a:masterClrMapping/>
+  </p:clrMapOvr>
+</p:notes>
+</file>
+
+<file path=ppt/notesSlides/notesSlide5.xml><?xml version="1.0" encoding="utf-8"?>
 <p:notes xmlns:a="http://schemas.openxmlformats.org/drawingml/2006/main" xmlns:r="http://schemas.openxmlformats.org/officeDocument/2006/relationships" xmlns:p="http://schemas.openxmlformats.org/presentationml/2006/main" showMasterSp="0" showMasterPhAnim="0">
   <p:cSld>
     <p:spTree>
@@ -8474,6 +8592,336 @@
 </p:sld>
 </file>
 
+<file path=ppt/slides/slide10.xml><?xml version="1.0" encoding="utf-8"?>
+<p:sld xmlns:a="http://schemas.openxmlformats.org/drawingml/2006/main" xmlns:r="http://schemas.openxmlformats.org/officeDocument/2006/relationships" xmlns:p="http://schemas.openxmlformats.org/presentationml/2006/main">
+  <p:cSld>
+    <p:bg>
+      <p:bgPr>
+        <a:blipFill>
+          <a:blip r:embed="rId3">
+            <a:alphaModFix/>
+          </a:blip>
+          <a:stretch>
+            <a:fillRect/>
+          </a:stretch>
+        </a:blipFill>
+        <a:effectLst/>
+      </p:bgPr>
+    </p:bg>
+    <p:spTree>
+      <p:nvGrpSpPr>
+        <p:cNvPr id="1" name="Shape 1067"/>
+        <p:cNvGrpSpPr/>
+        <p:nvPr/>
+      </p:nvGrpSpPr>
+      <p:grpSpPr>
+        <a:xfrm>
+          <a:off x="0" y="0"/>
+          <a:ext cx="0" cy="0"/>
+          <a:chOff x="0" y="0"/>
+          <a:chExt cx="0" cy="0"/>
+        </a:xfrm>
+      </p:grpSpPr>
+      <p:grpSp>
+        <p:nvGrpSpPr>
+          <p:cNvPr id="1068" name="Google Shape;1068;p36"/>
+          <p:cNvGrpSpPr/>
+          <p:nvPr/>
+        </p:nvGrpSpPr>
+        <p:grpSpPr>
+          <a:xfrm>
+            <a:off x="0" y="2139400"/>
+            <a:ext cx="4962900" cy="3012375"/>
+            <a:chOff x="0" y="2139400"/>
+            <a:chExt cx="4962900" cy="3012375"/>
+          </a:xfrm>
+        </p:grpSpPr>
+        <p:sp>
+          <p:nvSpPr>
+            <p:cNvPr id="1069" name="Google Shape;1069;p36"/>
+            <p:cNvSpPr/>
+            <p:nvPr/>
+          </p:nvSpPr>
+          <p:spPr>
+            <a:xfrm>
+              <a:off x="0" y="3486775"/>
+              <a:ext cx="4038900" cy="1665000"/>
+            </a:xfrm>
+            <a:prstGeom prst="rect">
+              <a:avLst/>
+            </a:prstGeom>
+            <a:solidFill>
+              <a:schemeClr val="accent2"/>
+            </a:solidFill>
+            <a:ln>
+              <a:noFill/>
+            </a:ln>
+          </p:spPr>
+          <p:txBody>
+            <a:bodyPr spcFirstLastPara="1" wrap="square" lIns="91425" tIns="91425" rIns="91425" bIns="91425" anchor="ctr" anchorCtr="0">
+              <a:noAutofit/>
+            </a:bodyPr>
+            <a:lstStyle/>
+            <a:p>
+              <a:pPr marL="0" lvl="0" indent="0" algn="l" rtl="0">
+                <a:spcBef>
+                  <a:spcPts val="0"/>
+                </a:spcBef>
+                <a:spcAft>
+                  <a:spcPts val="0"/>
+                </a:spcAft>
+                <a:buNone/>
+              </a:pPr>
+              <a:endParaRPr/>
+            </a:p>
+          </p:txBody>
+        </p:sp>
+        <p:sp>
+          <p:nvSpPr>
+            <p:cNvPr id="1070" name="Google Shape;1070;p36"/>
+            <p:cNvSpPr/>
+            <p:nvPr/>
+          </p:nvSpPr>
+          <p:spPr>
+            <a:xfrm>
+              <a:off x="4038900" y="4219500"/>
+              <a:ext cx="924000" cy="924000"/>
+            </a:xfrm>
+            <a:prstGeom prst="rect">
+              <a:avLst/>
+            </a:prstGeom>
+            <a:solidFill>
+              <a:schemeClr val="accent1"/>
+            </a:solidFill>
+            <a:ln>
+              <a:noFill/>
+            </a:ln>
+          </p:spPr>
+          <p:txBody>
+            <a:bodyPr spcFirstLastPara="1" wrap="square" lIns="91425" tIns="91425" rIns="91425" bIns="91425" anchor="ctr" anchorCtr="0">
+              <a:noAutofit/>
+            </a:bodyPr>
+            <a:lstStyle/>
+            <a:p>
+              <a:pPr marL="0" lvl="0" indent="0" algn="l" rtl="0">
+                <a:spcBef>
+                  <a:spcPts val="0"/>
+                </a:spcBef>
+                <a:spcAft>
+                  <a:spcPts val="0"/>
+                </a:spcAft>
+                <a:buNone/>
+              </a:pPr>
+              <a:endParaRPr/>
+            </a:p>
+          </p:txBody>
+        </p:sp>
+        <p:grpSp>
+          <p:nvGrpSpPr>
+            <p:cNvPr id="1071" name="Google Shape;1071;p36"/>
+            <p:cNvGrpSpPr/>
+            <p:nvPr/>
+          </p:nvGrpSpPr>
+          <p:grpSpPr>
+            <a:xfrm>
+              <a:off x="0" y="2139400"/>
+              <a:ext cx="1351800" cy="1347375"/>
+              <a:chOff x="0" y="2139400"/>
+              <a:chExt cx="1351800" cy="1347375"/>
+            </a:xfrm>
+          </p:grpSpPr>
+          <p:sp>
+            <p:nvSpPr>
+              <p:cNvPr id="1072" name="Google Shape;1072;p36"/>
+              <p:cNvSpPr/>
+              <p:nvPr/>
+            </p:nvSpPr>
+            <p:spPr>
+              <a:xfrm>
+                <a:off x="0" y="2562775"/>
+                <a:ext cx="924000" cy="924000"/>
+              </a:xfrm>
+              <a:prstGeom prst="rect">
+                <a:avLst/>
+              </a:prstGeom>
+              <a:solidFill>
+                <a:schemeClr val="accent3"/>
+              </a:solidFill>
+              <a:ln>
+                <a:noFill/>
+              </a:ln>
+            </p:spPr>
+            <p:txBody>
+              <a:bodyPr spcFirstLastPara="1" wrap="square" lIns="91425" tIns="91425" rIns="91425" bIns="91425" anchor="ctr" anchorCtr="0">
+                <a:noAutofit/>
+              </a:bodyPr>
+              <a:lstStyle/>
+              <a:p>
+                <a:pPr marL="0" lvl="0" indent="0" algn="l" rtl="0">
+                  <a:spcBef>
+                    <a:spcPts val="0"/>
+                  </a:spcBef>
+                  <a:spcAft>
+                    <a:spcPts val="0"/>
+                  </a:spcAft>
+                  <a:buNone/>
+                </a:pPr>
+                <a:endParaRPr/>
+              </a:p>
+            </p:txBody>
+          </p:sp>
+          <p:sp>
+            <p:nvSpPr>
+              <p:cNvPr id="1073" name="Google Shape;1073;p36"/>
+              <p:cNvSpPr/>
+              <p:nvPr/>
+            </p:nvSpPr>
+            <p:spPr>
+              <a:xfrm>
+                <a:off x="924000" y="2139400"/>
+                <a:ext cx="427800" cy="427800"/>
+              </a:xfrm>
+              <a:prstGeom prst="rect">
+                <a:avLst/>
+              </a:prstGeom>
+              <a:solidFill>
+                <a:schemeClr val="accent2"/>
+              </a:solidFill>
+              <a:ln>
+                <a:noFill/>
+              </a:ln>
+            </p:spPr>
+            <p:txBody>
+              <a:bodyPr spcFirstLastPara="1" wrap="square" lIns="91425" tIns="91425" rIns="91425" bIns="91425" anchor="ctr" anchorCtr="0">
+                <a:noAutofit/>
+              </a:bodyPr>
+              <a:lstStyle/>
+              <a:p>
+                <a:pPr marL="0" lvl="0" indent="0" algn="l" rtl="0">
+                  <a:spcBef>
+                    <a:spcPts val="0"/>
+                  </a:spcBef>
+                  <a:spcAft>
+                    <a:spcPts val="0"/>
+                  </a:spcAft>
+                  <a:buNone/>
+                </a:pPr>
+                <a:endParaRPr/>
+              </a:p>
+            </p:txBody>
+          </p:sp>
+        </p:grpSp>
+      </p:grpSp>
+      <p:sp>
+        <p:nvSpPr>
+          <p:cNvPr id="1074" name="Google Shape;1074;p36"/>
+          <p:cNvSpPr txBox="1">
+            <a:spLocks noGrp="1"/>
+          </p:cNvSpPr>
+          <p:nvPr>
+            <p:ph type="title"/>
+          </p:nvPr>
+        </p:nvSpPr>
+        <p:spPr>
+          <a:xfrm>
+            <a:off x="581925" y="3391646"/>
+            <a:ext cx="4126500" cy="1321200"/>
+          </a:xfrm>
+          <a:prstGeom prst="rect">
+            <a:avLst/>
+          </a:prstGeom>
+        </p:spPr>
+        <p:txBody>
+          <a:bodyPr spcFirstLastPara="1" wrap="square" lIns="91425" tIns="91425" rIns="91425" bIns="91425" anchor="b" anchorCtr="0">
+            <a:noAutofit/>
+          </a:bodyPr>
+          <a:lstStyle/>
+          <a:p>
+            <a:pPr marL="0" lvl="0" indent="0" algn="l" rtl="0">
+              <a:spcBef>
+                <a:spcPts val="0"/>
+              </a:spcBef>
+              <a:spcAft>
+                <a:spcPts val="0"/>
+              </a:spcAft>
+              <a:buNone/>
+            </a:pPr>
+            <a:r>
+              <a:rPr lang="en" strike="sngStrike" dirty="0"/>
+              <a:t>A</a:t>
+            </a:r>
+            <a:r>
+              <a:rPr lang="en" dirty="0"/>
+              <a:t> </a:t>
+            </a:r>
+            <a:r>
+              <a:rPr lang="en" strike="sngStrike" dirty="0"/>
+              <a:t>Picture</a:t>
+            </a:r>
+            <a:r>
+              <a:rPr lang="en" dirty="0"/>
+              <a:t> Is Worth a Thousand Words</a:t>
+            </a:r>
+            <a:endParaRPr dirty="0"/>
+          </a:p>
+        </p:txBody>
+      </p:sp>
+      <p:sp>
+        <p:nvSpPr>
+          <p:cNvPr id="2" name="Rectangle 1">
+            <a:extLst>
+              <a:ext uri="{FF2B5EF4-FFF2-40B4-BE49-F238E27FC236}">
+                <a16:creationId xmlns:a16="http://schemas.microsoft.com/office/drawing/2014/main" id="{BE14A0EE-C90A-514F-9E33-49E8941689C4}"/>
+              </a:ext>
+            </a:extLst>
+          </p:cNvPr>
+          <p:cNvSpPr/>
+          <p:nvPr/>
+        </p:nvSpPr>
+        <p:spPr>
+          <a:xfrm>
+            <a:off x="391425" y="3386930"/>
+            <a:ext cx="1734675" cy="523220"/>
+          </a:xfrm>
+          <a:prstGeom prst="rect">
+            <a:avLst/>
+          </a:prstGeom>
+          <a:noFill/>
+        </p:spPr>
+        <p:txBody>
+          <a:bodyPr wrap="square" lIns="91440" tIns="45720" rIns="91440" bIns="45720">
+            <a:spAutoFit/>
+          </a:bodyPr>
+          <a:lstStyle/>
+          <a:p>
+            <a:pPr algn="ctr"/>
+            <a:r>
+              <a:rPr lang="en-US" sz="2800" b="1" dirty="0">
+                <a:ln w="0"/>
+                <a:solidFill>
+                  <a:schemeClr val="accent1"/>
+                </a:solidFill>
+                <a:effectLst>
+                  <a:outerShdw blurRad="38100" dist="25400" dir="5400000" algn="ctr" rotWithShape="0">
+                    <a:srgbClr val="6E747A">
+                      <a:alpha val="43000"/>
+                    </a:srgbClr>
+                  </a:outerShdw>
+                </a:effectLst>
+              </a:rPr>
+              <a:t>DATA</a:t>
+            </a:r>
+          </a:p>
+        </p:txBody>
+      </p:sp>
+    </p:spTree>
+  </p:cSld>
+  <p:clrMapOvr>
+    <a:masterClrMapping/>
+  </p:clrMapOvr>
+</p:sld>
+</file>
+
 <file path=ppt/slides/slide2.xml><?xml version="1.0" encoding="utf-8"?>
 <p:sld xmlns:a="http://schemas.openxmlformats.org/drawingml/2006/main" xmlns:r="http://schemas.openxmlformats.org/officeDocument/2006/relationships" xmlns:p="http://schemas.openxmlformats.org/presentationml/2006/main">
   <p:cSld>
@@ -8553,7 +9001,7 @@
         </p:nvSpPr>
         <p:spPr>
           <a:xfrm>
-            <a:off x="358563" y="486525"/>
+            <a:off x="179450" y="343564"/>
             <a:ext cx="3684394" cy="577800"/>
           </a:xfrm>
           <a:prstGeom prst="rect">
@@ -8571,10 +9019,10 @@
           <a:lstStyle/>
           <a:p>
             <a:r>
-              <a:rPr lang="en" sz="3200" dirty="0"/>
+              <a:rPr lang="en" sz="3200" b="1" dirty="0"/>
               <a:t>Main Objective</a:t>
             </a:r>
-            <a:endParaRPr sz="3200" dirty="0"/>
+            <a:endParaRPr sz="3200" b="1" dirty="0"/>
           </a:p>
         </p:txBody>
       </p:sp>
@@ -12955,7 +13403,7 @@
         </p:nvGrpSpPr>
         <p:grpSpPr>
           <a:xfrm>
-            <a:off x="3046569" y="277528"/>
+            <a:off x="2964947" y="161993"/>
             <a:ext cx="898897" cy="746786"/>
             <a:chOff x="2623237" y="2431047"/>
             <a:chExt cx="355024" cy="332630"/>
@@ -16712,6 +17160,45 @@
           </a:p>
         </p:txBody>
       </p:sp>
+      <p:sp>
+        <p:nvSpPr>
+          <p:cNvPr id="2" name="TextBox 1">
+            <a:extLst>
+              <a:ext uri="{FF2B5EF4-FFF2-40B4-BE49-F238E27FC236}">
+                <a16:creationId xmlns:a16="http://schemas.microsoft.com/office/drawing/2014/main" id="{930E03CB-D9B6-74F7-0DE3-C76B480DF77C}"/>
+              </a:ext>
+            </a:extLst>
+          </p:cNvPr>
+          <p:cNvSpPr txBox="1"/>
+          <p:nvPr/>
+        </p:nvSpPr>
+        <p:spPr>
+          <a:xfrm>
+            <a:off x="7480323" y="474686"/>
+            <a:ext cx="1085554" cy="307777"/>
+          </a:xfrm>
+          <a:prstGeom prst="rect">
+            <a:avLst/>
+          </a:prstGeom>
+          <a:noFill/>
+        </p:spPr>
+        <p:txBody>
+          <a:bodyPr wrap="none" rtlCol="0">
+            <a:spAutoFit/>
+          </a:bodyPr>
+          <a:lstStyle/>
+          <a:p>
+            <a:r>
+              <a:rPr lang="en-US" dirty="0">
+                <a:solidFill>
+                  <a:schemeClr val="bg1"/>
+                </a:solidFill>
+              </a:rPr>
+              <a:t>+ Appendix</a:t>
+            </a:r>
+          </a:p>
+        </p:txBody>
+      </p:sp>
     </p:spTree>
     <p:extLst>
       <p:ext uri="{BB962C8B-B14F-4D97-AF65-F5344CB8AC3E}">
@@ -16742,6 +17229,36 @@
           <a:chExt cx="0" cy="0"/>
         </a:xfrm>
       </p:grpSpPr>
+      <p:pic>
+        <p:nvPicPr>
+          <p:cNvPr id="5" name="Picture 4" descr="A screenshot of a calendar&#10;&#10;Description automatically generated">
+            <a:extLst>
+              <a:ext uri="{FF2B5EF4-FFF2-40B4-BE49-F238E27FC236}">
+                <a16:creationId xmlns:a16="http://schemas.microsoft.com/office/drawing/2014/main" id="{1CBE75A3-485B-DFBD-4A7F-20B52F632440}"/>
+              </a:ext>
+            </a:extLst>
+          </p:cNvPr>
+          <p:cNvPicPr>
+            <a:picLocks noChangeAspect="1"/>
+          </p:cNvPicPr>
+          <p:nvPr/>
+        </p:nvPicPr>
+        <p:blipFill>
+          <a:blip r:embed="rId3"/>
+          <a:stretch>
+            <a:fillRect/>
+          </a:stretch>
+        </p:blipFill>
+        <p:spPr>
+          <a:xfrm>
+            <a:off x="3653242" y="589227"/>
+            <a:ext cx="5455451" cy="889476"/>
+          </a:xfrm>
+          <a:prstGeom prst="rect">
+            <a:avLst/>
+          </a:prstGeom>
+        </p:spPr>
+      </p:pic>
       <p:sp>
         <p:nvSpPr>
           <p:cNvPr id="2" name="Text Placeholder 1">
@@ -16760,8 +17277,8 @@
         </p:nvSpPr>
         <p:spPr>
           <a:xfrm>
-            <a:off x="435539" y="1219957"/>
-            <a:ext cx="7447809" cy="2857040"/>
+            <a:off x="93277" y="1082128"/>
+            <a:ext cx="3400771" cy="2857040"/>
           </a:xfrm>
         </p:spPr>
         <p:txBody>
@@ -16771,10 +17288,60 @@
             <a:endParaRPr lang="en-US" sz="1600" dirty="0"/>
           </a:p>
           <a:p>
+            <a:r>
+              <a:rPr lang="en-US" sz="1600" dirty="0"/>
+              <a:t>The Apple product was highly discounted by </a:t>
+            </a:r>
+            <a:r>
+              <a:rPr lang="en-US" sz="1600" b="1" dirty="0"/>
+              <a:t>$100 </a:t>
+            </a:r>
+            <a:r>
+              <a:rPr lang="en-US" sz="1600" dirty="0"/>
+              <a:t>in </a:t>
+            </a:r>
+            <a:r>
+              <a:rPr lang="en-US" sz="1600" b="1" dirty="0"/>
+              <a:t>City-2</a:t>
+            </a:r>
+            <a:r>
+              <a:rPr lang="en-US" sz="1600" dirty="0"/>
+              <a:t> starting </a:t>
+            </a:r>
+            <a:r>
+              <a:rPr lang="en-US" sz="1600" b="1" dirty="0"/>
+              <a:t>Jan-2022</a:t>
+            </a:r>
+            <a:r>
+              <a:rPr lang="en-US" sz="1600" dirty="0"/>
+              <a:t> and lasted for </a:t>
+            </a:r>
+            <a:r>
+              <a:rPr lang="en-US" sz="1600" b="1" dirty="0"/>
+              <a:t>3-months</a:t>
+            </a:r>
+            <a:r>
+              <a:rPr lang="en-US" sz="1600" dirty="0"/>
+              <a:t>.</a:t>
+            </a:r>
+          </a:p>
+          <a:p>
+            <a:endParaRPr lang="en-US" sz="1600" dirty="0"/>
+          </a:p>
+          <a:p>
+            <a:endParaRPr lang="en-US" sz="1600" dirty="0"/>
+          </a:p>
+          <a:p>
             <a:pPr marL="114300" indent="0">
               <a:buNone/>
             </a:pPr>
             <a:endParaRPr lang="en-US" sz="1600" dirty="0"/>
+          </a:p>
+          <a:p>
+            <a:r>
+              <a:rPr lang="en-US" sz="1600" dirty="0"/>
+              <a:t>The Average % lift in Sales driven by discounts. (Lift Calc = Prior unit sales &lt;–&gt; Avg unit sales in discount period )</a:t>
+            </a:r>
           </a:p>
           <a:p>
             <a:endParaRPr lang="en-US" sz="1600" dirty="0"/>
@@ -16805,7 +17372,7 @@
         </p:nvSpPr>
         <p:spPr>
           <a:xfrm>
-            <a:off x="435539" y="339438"/>
+            <a:off x="227383" y="92762"/>
             <a:ext cx="5709545" cy="677106"/>
           </a:xfrm>
         </p:spPr>
@@ -16814,10 +17381,10 @@
           <a:lstStyle/>
           <a:p>
             <a:r>
-              <a:rPr lang="en" sz="2000" b="1" dirty="0"/>
+              <a:rPr lang="en" sz="2000" b="1" u="sng" dirty="0"/>
               <a:t>Significant Price Discount</a:t>
             </a:r>
-            <a:endParaRPr lang="en-US" sz="2000" b="1" dirty="0"/>
+            <a:endParaRPr lang="en-US" sz="2000" b="1" u="sng" dirty="0"/>
           </a:p>
         </p:txBody>
       </p:sp>
@@ -16835,7 +17402,7 @@
         </p:nvSpPr>
         <p:spPr>
           <a:xfrm>
-            <a:off x="3290311" y="551436"/>
+            <a:off x="3021250" y="311861"/>
             <a:ext cx="472797" cy="428278"/>
           </a:xfrm>
           <a:custGeom>
@@ -17287,8 +17854,1032 @@
         </p:nvSpPr>
         <p:spPr>
           <a:xfrm>
-            <a:off x="4707228" y="3116687"/>
-            <a:ext cx="534473" cy="806856"/>
+            <a:off x="3683693" y="933603"/>
+            <a:ext cx="5394548" cy="200723"/>
+          </a:xfrm>
+          <a:prstGeom prst="rect">
+            <a:avLst/>
+          </a:prstGeom>
+          <a:noFill/>
+          <a:ln>
+            <a:solidFill>
+              <a:srgbClr val="FF0000"/>
+            </a:solidFill>
+          </a:ln>
+        </p:spPr>
+        <p:style>
+          <a:lnRef idx="2">
+            <a:schemeClr val="accent1">
+              <a:shade val="50000"/>
+            </a:schemeClr>
+          </a:lnRef>
+          <a:fillRef idx="1">
+            <a:schemeClr val="accent1"/>
+          </a:fillRef>
+          <a:effectRef idx="0">
+            <a:schemeClr val="accent1"/>
+          </a:effectRef>
+          <a:fontRef idx="minor">
+            <a:schemeClr val="lt1"/>
+          </a:fontRef>
+        </p:style>
+        <p:txBody>
+          <a:bodyPr rtlCol="0" anchor="ctr"/>
+          <a:lstStyle/>
+          <a:p>
+            <a:pPr algn="ctr"/>
+            <a:endParaRPr lang="en-US"/>
+          </a:p>
+        </p:txBody>
+      </p:sp>
+      <p:pic>
+        <p:nvPicPr>
+          <p:cNvPr id="8" name="Picture 7" descr="A black and white calendar&#10;&#10;Description automatically generated">
+            <a:extLst>
+              <a:ext uri="{FF2B5EF4-FFF2-40B4-BE49-F238E27FC236}">
+                <a16:creationId xmlns:a16="http://schemas.microsoft.com/office/drawing/2014/main" id="{9F04A641-B701-7C6E-F859-78B613EE2CDF}"/>
+              </a:ext>
+            </a:extLst>
+          </p:cNvPr>
+          <p:cNvPicPr>
+            <a:picLocks noChangeAspect="1"/>
+          </p:cNvPicPr>
+          <p:nvPr/>
+        </p:nvPicPr>
+        <p:blipFill>
+          <a:blip r:embed="rId4"/>
+          <a:stretch>
+            <a:fillRect/>
+          </a:stretch>
+        </p:blipFill>
+        <p:spPr>
+          <a:xfrm>
+            <a:off x="3653242" y="1576110"/>
+            <a:ext cx="5055218" cy="1225924"/>
+          </a:xfrm>
+          <a:prstGeom prst="rect">
+            <a:avLst/>
+          </a:prstGeom>
+        </p:spPr>
+      </p:pic>
+      <p:sp>
+        <p:nvSpPr>
+          <p:cNvPr id="9" name="Rectangle 8">
+            <a:extLst>
+              <a:ext uri="{FF2B5EF4-FFF2-40B4-BE49-F238E27FC236}">
+                <a16:creationId xmlns:a16="http://schemas.microsoft.com/office/drawing/2014/main" id="{A62F0EE4-9EFA-7355-3610-B3634175D8D0}"/>
+              </a:ext>
+            </a:extLst>
+          </p:cNvPr>
+          <p:cNvSpPr/>
+          <p:nvPr/>
+        </p:nvSpPr>
+        <p:spPr>
+          <a:xfrm>
+            <a:off x="3714146" y="2038230"/>
+            <a:ext cx="4994314" cy="442460"/>
+          </a:xfrm>
+          <a:prstGeom prst="rect">
+            <a:avLst/>
+          </a:prstGeom>
+          <a:noFill/>
+          <a:ln>
+            <a:solidFill>
+              <a:srgbClr val="FF0000"/>
+            </a:solidFill>
+          </a:ln>
+        </p:spPr>
+        <p:style>
+          <a:lnRef idx="2">
+            <a:schemeClr val="accent1">
+              <a:shade val="50000"/>
+            </a:schemeClr>
+          </a:lnRef>
+          <a:fillRef idx="1">
+            <a:schemeClr val="accent1"/>
+          </a:fillRef>
+          <a:effectRef idx="0">
+            <a:schemeClr val="accent1"/>
+          </a:effectRef>
+          <a:fontRef idx="minor">
+            <a:schemeClr val="lt1"/>
+          </a:fontRef>
+        </p:style>
+        <p:txBody>
+          <a:bodyPr rtlCol="0" anchor="ctr"/>
+          <a:lstStyle/>
+          <a:p>
+            <a:pPr algn="ctr"/>
+            <a:endParaRPr lang="en-US"/>
+          </a:p>
+        </p:txBody>
+      </p:sp>
+      <p:pic>
+        <p:nvPicPr>
+          <p:cNvPr id="12" name="Picture 11" descr="A graph of green bars&#10;&#10;Description automatically generated with medium confidence">
+            <a:extLst>
+              <a:ext uri="{FF2B5EF4-FFF2-40B4-BE49-F238E27FC236}">
+                <a16:creationId xmlns:a16="http://schemas.microsoft.com/office/drawing/2014/main" id="{8A5E34C4-E582-4077-D7C2-153CC166F326}"/>
+              </a:ext>
+            </a:extLst>
+          </p:cNvPr>
+          <p:cNvPicPr>
+            <a:picLocks noChangeAspect="1"/>
+          </p:cNvPicPr>
+          <p:nvPr/>
+        </p:nvPicPr>
+        <p:blipFill>
+          <a:blip r:embed="rId5"/>
+          <a:stretch>
+            <a:fillRect/>
+          </a:stretch>
+        </p:blipFill>
+        <p:spPr>
+          <a:xfrm>
+            <a:off x="3653242" y="2942810"/>
+            <a:ext cx="2542178" cy="2021876"/>
+          </a:xfrm>
+          <a:prstGeom prst="rect">
+            <a:avLst/>
+          </a:prstGeom>
+        </p:spPr>
+      </p:pic>
+      <p:pic>
+        <p:nvPicPr>
+          <p:cNvPr id="14" name="Picture 13" descr="A screenshot of a black and white website&#10;&#10;Description automatically generated">
+            <a:extLst>
+              <a:ext uri="{FF2B5EF4-FFF2-40B4-BE49-F238E27FC236}">
+                <a16:creationId xmlns:a16="http://schemas.microsoft.com/office/drawing/2014/main" id="{94B68874-989E-4230-D643-BD20A9576933}"/>
+              </a:ext>
+            </a:extLst>
+          </p:cNvPr>
+          <p:cNvPicPr>
+            <a:picLocks noChangeAspect="1"/>
+          </p:cNvPicPr>
+          <p:nvPr/>
+        </p:nvPicPr>
+        <p:blipFill>
+          <a:blip r:embed="rId6"/>
+          <a:stretch>
+            <a:fillRect/>
+          </a:stretch>
+        </p:blipFill>
+        <p:spPr>
+          <a:xfrm>
+            <a:off x="6519745" y="3482278"/>
+            <a:ext cx="1556811" cy="913780"/>
+          </a:xfrm>
+          <a:prstGeom prst="rect">
+            <a:avLst/>
+          </a:prstGeom>
+        </p:spPr>
+      </p:pic>
+      <p:sp>
+        <p:nvSpPr>
+          <p:cNvPr id="15" name="Rectangle 14">
+            <a:extLst>
+              <a:ext uri="{FF2B5EF4-FFF2-40B4-BE49-F238E27FC236}">
+                <a16:creationId xmlns:a16="http://schemas.microsoft.com/office/drawing/2014/main" id="{8A604E74-5847-3C49-97A0-A48D3DB381DA}"/>
+              </a:ext>
+            </a:extLst>
+          </p:cNvPr>
+          <p:cNvSpPr/>
+          <p:nvPr/>
+        </p:nvSpPr>
+        <p:spPr>
+          <a:xfrm>
+            <a:off x="7582830" y="3688759"/>
+            <a:ext cx="493726" cy="707299"/>
+          </a:xfrm>
+          <a:prstGeom prst="rect">
+            <a:avLst/>
+          </a:prstGeom>
+          <a:noFill/>
+          <a:ln>
+            <a:solidFill>
+              <a:srgbClr val="FF0000"/>
+            </a:solidFill>
+          </a:ln>
+        </p:spPr>
+        <p:style>
+          <a:lnRef idx="2">
+            <a:schemeClr val="accent1">
+              <a:shade val="50000"/>
+            </a:schemeClr>
+          </a:lnRef>
+          <a:fillRef idx="1">
+            <a:schemeClr val="accent1"/>
+          </a:fillRef>
+          <a:effectRef idx="0">
+            <a:schemeClr val="accent1"/>
+          </a:effectRef>
+          <a:fontRef idx="minor">
+            <a:schemeClr val="lt1"/>
+          </a:fontRef>
+        </p:style>
+        <p:txBody>
+          <a:bodyPr rtlCol="0" anchor="ctr"/>
+          <a:lstStyle/>
+          <a:p>
+            <a:pPr algn="ctr"/>
+            <a:endParaRPr lang="en-US"/>
+          </a:p>
+        </p:txBody>
+      </p:sp>
+      <p:cxnSp>
+        <p:nvCxnSpPr>
+          <p:cNvPr id="17" name="Straight Connector 16">
+            <a:extLst>
+              <a:ext uri="{FF2B5EF4-FFF2-40B4-BE49-F238E27FC236}">
+                <a16:creationId xmlns:a16="http://schemas.microsoft.com/office/drawing/2014/main" id="{02DB48E8-3B2D-7342-ED4E-D97C92833AE5}"/>
+              </a:ext>
+            </a:extLst>
+          </p:cNvPr>
+          <p:cNvCxnSpPr/>
+          <p:nvPr/>
+        </p:nvCxnSpPr>
+        <p:spPr>
+          <a:xfrm>
+            <a:off x="401445" y="2862146"/>
+            <a:ext cx="3017520" cy="0"/>
+          </a:xfrm>
+          <a:prstGeom prst="line">
+            <a:avLst/>
+          </a:prstGeom>
+          <a:ln>
+            <a:solidFill>
+              <a:schemeClr val="bg1"/>
+            </a:solidFill>
+          </a:ln>
+        </p:spPr>
+        <p:style>
+          <a:lnRef idx="1">
+            <a:schemeClr val="accent1"/>
+          </a:lnRef>
+          <a:fillRef idx="0">
+            <a:schemeClr val="accent1"/>
+          </a:fillRef>
+          <a:effectRef idx="0">
+            <a:schemeClr val="accent1"/>
+          </a:effectRef>
+          <a:fontRef idx="minor">
+            <a:schemeClr val="tx1"/>
+          </a:fontRef>
+        </p:style>
+      </p:cxnSp>
+    </p:spTree>
+    <p:extLst>
+      <p:ext uri="{BB962C8B-B14F-4D97-AF65-F5344CB8AC3E}">
+        <p14:creationId xmlns:p14="http://schemas.microsoft.com/office/powerpoint/2010/main" val="3146209367"/>
+      </p:ext>
+    </p:extLst>
+  </p:cSld>
+  <p:clrMapOvr>
+    <a:masterClrMapping/>
+  </p:clrMapOvr>
+</p:sld>
+</file>
+
+<file path=ppt/slides/slide5.xml><?xml version="1.0" encoding="utf-8"?>
+<p:sld xmlns:a="http://schemas.openxmlformats.org/drawingml/2006/main" xmlns:r="http://schemas.openxmlformats.org/officeDocument/2006/relationships" xmlns:p="http://schemas.openxmlformats.org/presentationml/2006/main">
+  <p:cSld>
+    <p:spTree>
+      <p:nvGrpSpPr>
+        <p:cNvPr id="1" name=""/>
+        <p:cNvGrpSpPr/>
+        <p:nvPr/>
+      </p:nvGrpSpPr>
+      <p:grpSpPr>
+        <a:xfrm>
+          <a:off x="0" y="0"/>
+          <a:ext cx="0" cy="0"/>
+          <a:chOff x="0" y="0"/>
+          <a:chExt cx="0" cy="0"/>
+        </a:xfrm>
+      </p:grpSpPr>
+      <p:sp>
+        <p:nvSpPr>
+          <p:cNvPr id="2" name="Text Placeholder 1">
+            <a:extLst>
+              <a:ext uri="{FF2B5EF4-FFF2-40B4-BE49-F238E27FC236}">
+                <a16:creationId xmlns:a16="http://schemas.microsoft.com/office/drawing/2014/main" id="{905FED31-07B4-FF42-B4DB-0FEAE4C43C31}"/>
+              </a:ext>
+            </a:extLst>
+          </p:cNvPr>
+          <p:cNvSpPr>
+            <a:spLocks noGrp="1"/>
+          </p:cNvSpPr>
+          <p:nvPr>
+            <p:ph type="body" idx="1"/>
+          </p:nvPr>
+        </p:nvSpPr>
+        <p:spPr>
+          <a:xfrm>
+            <a:off x="160184" y="3209068"/>
+            <a:ext cx="7214392" cy="1841670"/>
+          </a:xfrm>
+        </p:spPr>
+        <p:txBody>
+          <a:bodyPr/>
+          <a:lstStyle/>
+          <a:p>
+            <a:r>
+              <a:rPr lang="en-US" sz="1600" dirty="0"/>
+              <a:t>The best model selected for 2024 projections : AutoArima  </a:t>
+            </a:r>
+          </a:p>
+          <a:p>
+            <a:r>
+              <a:rPr lang="en-US" sz="1600" dirty="0"/>
+              <a:t>Exogenous/Co-variates : Discount, Seasonal Features (Recent 2-3 Years)</a:t>
+            </a:r>
+          </a:p>
+          <a:p>
+            <a:r>
+              <a:rPr lang="en-US" sz="1600" dirty="0"/>
+              <a:t>Back-testing/Forward walk validation: 2 Years. </a:t>
+            </a:r>
+            <a:r>
+              <a:rPr lang="en-US" sz="1600" dirty="0">
+                <a:highlight>
+                  <a:srgbClr val="808000"/>
+                </a:highlight>
+              </a:rPr>
+              <a:t>The annual forecast for 2024 </a:t>
+            </a:r>
+            <a:r>
+              <a:rPr lang="en-US" sz="1600" dirty="0">
+                <a:sym typeface="Wingdings" pitchFamily="2" charset="2"/>
+              </a:rPr>
+              <a:t></a:t>
+            </a:r>
+            <a:endParaRPr lang="en-US" sz="1600" dirty="0"/>
+          </a:p>
+          <a:p>
+            <a:pPr marL="114300" indent="0">
+              <a:buNone/>
+            </a:pPr>
+            <a:endParaRPr lang="en-US" sz="1600" dirty="0"/>
+          </a:p>
+          <a:p>
+            <a:endParaRPr lang="en-US" sz="1600" dirty="0"/>
+          </a:p>
+          <a:p>
+            <a:endParaRPr lang="en-US" sz="1600" dirty="0"/>
+          </a:p>
+          <a:p>
+            <a:endParaRPr lang="en-US" sz="1600" dirty="0"/>
+          </a:p>
+        </p:txBody>
+      </p:sp>
+      <p:sp>
+        <p:nvSpPr>
+          <p:cNvPr id="3" name="Title 2">
+            <a:extLst>
+              <a:ext uri="{FF2B5EF4-FFF2-40B4-BE49-F238E27FC236}">
+                <a16:creationId xmlns:a16="http://schemas.microsoft.com/office/drawing/2014/main" id="{355CFEDD-4D85-A24A-A106-2EA1B9050711}"/>
+              </a:ext>
+            </a:extLst>
+          </p:cNvPr>
+          <p:cNvSpPr>
+            <a:spLocks noGrp="1"/>
+          </p:cNvSpPr>
+          <p:nvPr>
+            <p:ph type="ctrTitle"/>
+          </p:nvPr>
+        </p:nvSpPr>
+        <p:spPr>
+          <a:xfrm>
+            <a:off x="227383" y="92762"/>
+            <a:ext cx="5709545" cy="677106"/>
+          </a:xfrm>
+        </p:spPr>
+        <p:txBody>
+          <a:bodyPr/>
+          <a:lstStyle/>
+          <a:p>
+            <a:r>
+              <a:rPr lang="en" sz="2000" b="1" u="sng" dirty="0"/>
+              <a:t>Sales Projection for 2024 broken by City</a:t>
+            </a:r>
+            <a:r>
+              <a:rPr lang="en" sz="2000" b="1" dirty="0"/>
+              <a:t>(Unique_id)</a:t>
+            </a:r>
+            <a:endParaRPr lang="en-US" sz="2000" b="1" dirty="0"/>
+          </a:p>
+        </p:txBody>
+      </p:sp>
+      <p:sp>
+        <p:nvSpPr>
+          <p:cNvPr id="22" name="Google Shape;11345;p60">
+            <a:extLst>
+              <a:ext uri="{FF2B5EF4-FFF2-40B4-BE49-F238E27FC236}">
+                <a16:creationId xmlns:a16="http://schemas.microsoft.com/office/drawing/2014/main" id="{7864C7CE-6BBA-3342-9116-CD143E4D779C}"/>
+              </a:ext>
+            </a:extLst>
+          </p:cNvPr>
+          <p:cNvSpPr/>
+          <p:nvPr/>
+        </p:nvSpPr>
+        <p:spPr>
+          <a:xfrm>
+            <a:off x="5820937" y="296528"/>
+            <a:ext cx="472797" cy="428278"/>
+          </a:xfrm>
+          <a:custGeom>
+            <a:avLst/>
+            <a:gdLst/>
+            <a:ahLst/>
+            <a:cxnLst/>
+            <a:rect l="l" t="t" r="r" b="b"/>
+            <a:pathLst>
+              <a:path w="12228" h="11183" extrusionOk="0">
+                <a:moveTo>
+                  <a:pt x="4560" y="3991"/>
+                </a:moveTo>
+                <a:cubicBezTo>
+                  <a:pt x="4739" y="3991"/>
+                  <a:pt x="4894" y="4146"/>
+                  <a:pt x="4894" y="4324"/>
+                </a:cubicBezTo>
+                <a:cubicBezTo>
+                  <a:pt x="4894" y="4503"/>
+                  <a:pt x="4739" y="4646"/>
+                  <a:pt x="4560" y="4646"/>
+                </a:cubicBezTo>
+                <a:cubicBezTo>
+                  <a:pt x="4382" y="4646"/>
+                  <a:pt x="4239" y="4503"/>
+                  <a:pt x="4239" y="4324"/>
+                </a:cubicBezTo>
+                <a:cubicBezTo>
+                  <a:pt x="4251" y="4134"/>
+                  <a:pt x="4382" y="3991"/>
+                  <a:pt x="4560" y="3991"/>
+                </a:cubicBezTo>
+                <a:close/>
+                <a:moveTo>
+                  <a:pt x="5930" y="1419"/>
+                </a:moveTo>
+                <a:lnTo>
+                  <a:pt x="5930" y="2003"/>
+                </a:lnTo>
+                <a:lnTo>
+                  <a:pt x="5941" y="4051"/>
+                </a:lnTo>
+                <a:lnTo>
+                  <a:pt x="5965" y="5872"/>
+                </a:lnTo>
+                <a:lnTo>
+                  <a:pt x="1619" y="4908"/>
+                </a:lnTo>
+                <a:cubicBezTo>
+                  <a:pt x="1869" y="3801"/>
+                  <a:pt x="2548" y="2848"/>
+                  <a:pt x="3489" y="2229"/>
+                </a:cubicBezTo>
+                <a:lnTo>
+                  <a:pt x="4275" y="3670"/>
+                </a:lnTo>
+                <a:cubicBezTo>
+                  <a:pt x="4025" y="3777"/>
+                  <a:pt x="3858" y="4027"/>
+                  <a:pt x="3858" y="4313"/>
+                </a:cubicBezTo>
+                <a:cubicBezTo>
+                  <a:pt x="3858" y="4694"/>
+                  <a:pt x="4179" y="5027"/>
+                  <a:pt x="4572" y="5027"/>
+                </a:cubicBezTo>
+                <a:cubicBezTo>
+                  <a:pt x="4965" y="5027"/>
+                  <a:pt x="5287" y="4705"/>
+                  <a:pt x="5287" y="4313"/>
+                </a:cubicBezTo>
+                <a:cubicBezTo>
+                  <a:pt x="5287" y="3967"/>
+                  <a:pt x="5037" y="3670"/>
+                  <a:pt x="4715" y="3610"/>
+                </a:cubicBezTo>
+                <a:lnTo>
+                  <a:pt x="3846" y="2015"/>
+                </a:lnTo>
+                <a:cubicBezTo>
+                  <a:pt x="4477" y="1657"/>
+                  <a:pt x="5168" y="1455"/>
+                  <a:pt x="5930" y="1419"/>
+                </a:cubicBezTo>
+                <a:close/>
+                <a:moveTo>
+                  <a:pt x="6287" y="4265"/>
+                </a:moveTo>
+                <a:cubicBezTo>
+                  <a:pt x="7227" y="4348"/>
+                  <a:pt x="7965" y="5158"/>
+                  <a:pt x="7965" y="6122"/>
+                </a:cubicBezTo>
+                <a:cubicBezTo>
+                  <a:pt x="7965" y="6491"/>
+                  <a:pt x="7846" y="6872"/>
+                  <a:pt x="7644" y="7170"/>
+                </a:cubicBezTo>
+                <a:lnTo>
+                  <a:pt x="6287" y="6039"/>
+                </a:lnTo>
+                <a:lnTo>
+                  <a:pt x="6287" y="4265"/>
+                </a:lnTo>
+                <a:close/>
+                <a:moveTo>
+                  <a:pt x="6477" y="348"/>
+                </a:moveTo>
+                <a:cubicBezTo>
+                  <a:pt x="9501" y="526"/>
+                  <a:pt x="11871" y="3039"/>
+                  <a:pt x="11871" y="6063"/>
+                </a:cubicBezTo>
+                <a:cubicBezTo>
+                  <a:pt x="11835" y="7349"/>
+                  <a:pt x="11454" y="8539"/>
+                  <a:pt x="10728" y="9516"/>
+                </a:cubicBezTo>
+                <a:cubicBezTo>
+                  <a:pt x="10692" y="9563"/>
+                  <a:pt x="10644" y="9575"/>
+                  <a:pt x="10609" y="9575"/>
+                </a:cubicBezTo>
+                <a:cubicBezTo>
+                  <a:pt x="10561" y="9575"/>
+                  <a:pt x="10513" y="9563"/>
+                  <a:pt x="10490" y="9527"/>
+                </a:cubicBezTo>
+                <a:lnTo>
+                  <a:pt x="9537" y="8730"/>
+                </a:lnTo>
+                <a:cubicBezTo>
+                  <a:pt x="10013" y="8123"/>
+                  <a:pt x="10311" y="7384"/>
+                  <a:pt x="10394" y="6610"/>
+                </a:cubicBezTo>
+                <a:cubicBezTo>
+                  <a:pt x="10406" y="6491"/>
+                  <a:pt x="10323" y="6396"/>
+                  <a:pt x="10204" y="6396"/>
+                </a:cubicBezTo>
+                <a:cubicBezTo>
+                  <a:pt x="10097" y="6396"/>
+                  <a:pt x="10025" y="6468"/>
+                  <a:pt x="10013" y="6551"/>
+                </a:cubicBezTo>
+                <a:cubicBezTo>
+                  <a:pt x="9930" y="7206"/>
+                  <a:pt x="9680" y="7849"/>
+                  <a:pt x="9299" y="8384"/>
+                </a:cubicBezTo>
+                <a:cubicBezTo>
+                  <a:pt x="9275" y="8396"/>
+                  <a:pt x="9263" y="8432"/>
+                  <a:pt x="9251" y="8444"/>
+                </a:cubicBezTo>
+                <a:cubicBezTo>
+                  <a:pt x="9251" y="8444"/>
+                  <a:pt x="9251" y="8456"/>
+                  <a:pt x="9239" y="8456"/>
+                </a:cubicBezTo>
+                <a:lnTo>
+                  <a:pt x="7954" y="7372"/>
+                </a:lnTo>
+                <a:cubicBezTo>
+                  <a:pt x="8227" y="7003"/>
+                  <a:pt x="8370" y="6539"/>
+                  <a:pt x="8370" y="6075"/>
+                </a:cubicBezTo>
+                <a:cubicBezTo>
+                  <a:pt x="8370" y="4908"/>
+                  <a:pt x="7465" y="3920"/>
+                  <a:pt x="6299" y="3836"/>
+                </a:cubicBezTo>
+                <a:lnTo>
+                  <a:pt x="6287" y="2146"/>
+                </a:lnTo>
+                <a:lnTo>
+                  <a:pt x="6418" y="2146"/>
+                </a:lnTo>
+                <a:cubicBezTo>
+                  <a:pt x="6453" y="2146"/>
+                  <a:pt x="6501" y="2146"/>
+                  <a:pt x="6525" y="2169"/>
+                </a:cubicBezTo>
+                <a:cubicBezTo>
+                  <a:pt x="8358" y="2360"/>
+                  <a:pt x="9811" y="3812"/>
+                  <a:pt x="10025" y="5646"/>
+                </a:cubicBezTo>
+                <a:cubicBezTo>
+                  <a:pt x="10037" y="5753"/>
+                  <a:pt x="10109" y="5813"/>
+                  <a:pt x="10216" y="5813"/>
+                </a:cubicBezTo>
+                <a:cubicBezTo>
+                  <a:pt x="10335" y="5813"/>
+                  <a:pt x="10430" y="5706"/>
+                  <a:pt x="10406" y="5598"/>
+                </a:cubicBezTo>
+                <a:cubicBezTo>
+                  <a:pt x="10192" y="3503"/>
+                  <a:pt x="8430" y="1848"/>
+                  <a:pt x="6299" y="1765"/>
+                </a:cubicBezTo>
+                <a:lnTo>
+                  <a:pt x="6299" y="526"/>
+                </a:lnTo>
+                <a:cubicBezTo>
+                  <a:pt x="6299" y="479"/>
+                  <a:pt x="6322" y="443"/>
+                  <a:pt x="6346" y="407"/>
+                </a:cubicBezTo>
+                <a:cubicBezTo>
+                  <a:pt x="6382" y="360"/>
+                  <a:pt x="6418" y="348"/>
+                  <a:pt x="6477" y="348"/>
+                </a:cubicBezTo>
+                <a:close/>
+                <a:moveTo>
+                  <a:pt x="1477" y="5277"/>
+                </a:moveTo>
+                <a:lnTo>
+                  <a:pt x="5870" y="6241"/>
+                </a:lnTo>
+                <a:lnTo>
+                  <a:pt x="4667" y="10575"/>
+                </a:lnTo>
+                <a:cubicBezTo>
+                  <a:pt x="2774" y="9980"/>
+                  <a:pt x="1405" y="8206"/>
+                  <a:pt x="1405" y="6110"/>
+                </a:cubicBezTo>
+                <a:cubicBezTo>
+                  <a:pt x="1405" y="5825"/>
+                  <a:pt x="1441" y="5539"/>
+                  <a:pt x="1477" y="5277"/>
+                </a:cubicBezTo>
+                <a:close/>
+                <a:moveTo>
+                  <a:pt x="6215" y="6468"/>
+                </a:moveTo>
+                <a:lnTo>
+                  <a:pt x="7549" y="7599"/>
+                </a:lnTo>
+                <a:lnTo>
+                  <a:pt x="9132" y="8920"/>
+                </a:lnTo>
+                <a:lnTo>
+                  <a:pt x="9573" y="9289"/>
+                </a:lnTo>
+                <a:cubicBezTo>
+                  <a:pt x="8680" y="10266"/>
+                  <a:pt x="7430" y="10813"/>
+                  <a:pt x="6108" y="10813"/>
+                </a:cubicBezTo>
+                <a:cubicBezTo>
+                  <a:pt x="5739" y="10813"/>
+                  <a:pt x="5382" y="10766"/>
+                  <a:pt x="5037" y="10694"/>
+                </a:cubicBezTo>
+                <a:lnTo>
+                  <a:pt x="6215" y="6468"/>
+                </a:lnTo>
+                <a:close/>
+                <a:moveTo>
+                  <a:pt x="6429" y="1"/>
+                </a:moveTo>
+                <a:cubicBezTo>
+                  <a:pt x="6297" y="1"/>
+                  <a:pt x="6159" y="59"/>
+                  <a:pt x="6060" y="157"/>
+                </a:cubicBezTo>
+                <a:cubicBezTo>
+                  <a:pt x="5953" y="264"/>
+                  <a:pt x="5882" y="407"/>
+                  <a:pt x="5882" y="562"/>
+                </a:cubicBezTo>
+                <a:lnTo>
+                  <a:pt x="5882" y="1038"/>
+                </a:lnTo>
+                <a:cubicBezTo>
+                  <a:pt x="5084" y="1062"/>
+                  <a:pt x="4310" y="1288"/>
+                  <a:pt x="3620" y="1669"/>
+                </a:cubicBezTo>
+                <a:lnTo>
+                  <a:pt x="3191" y="872"/>
+                </a:lnTo>
+                <a:cubicBezTo>
+                  <a:pt x="3155" y="812"/>
+                  <a:pt x="3084" y="764"/>
+                  <a:pt x="3024" y="764"/>
+                </a:cubicBezTo>
+                <a:lnTo>
+                  <a:pt x="393" y="764"/>
+                </a:lnTo>
+                <a:lnTo>
+                  <a:pt x="393" y="443"/>
+                </a:lnTo>
+                <a:cubicBezTo>
+                  <a:pt x="393" y="336"/>
+                  <a:pt x="298" y="241"/>
+                  <a:pt x="203" y="241"/>
+                </a:cubicBezTo>
+                <a:cubicBezTo>
+                  <a:pt x="95" y="241"/>
+                  <a:pt x="0" y="336"/>
+                  <a:pt x="0" y="443"/>
+                </a:cubicBezTo>
+                <a:lnTo>
+                  <a:pt x="0" y="1467"/>
+                </a:lnTo>
+                <a:cubicBezTo>
+                  <a:pt x="0" y="1574"/>
+                  <a:pt x="95" y="1657"/>
+                  <a:pt x="203" y="1657"/>
+                </a:cubicBezTo>
+                <a:cubicBezTo>
+                  <a:pt x="298" y="1657"/>
+                  <a:pt x="393" y="1562"/>
+                  <a:pt x="393" y="1467"/>
+                </a:cubicBezTo>
+                <a:lnTo>
+                  <a:pt x="393" y="1157"/>
+                </a:lnTo>
+                <a:lnTo>
+                  <a:pt x="2917" y="1157"/>
+                </a:lnTo>
+                <a:lnTo>
+                  <a:pt x="3310" y="1872"/>
+                </a:lnTo>
+                <a:cubicBezTo>
+                  <a:pt x="3024" y="2062"/>
+                  <a:pt x="2762" y="2277"/>
+                  <a:pt x="2501" y="2527"/>
+                </a:cubicBezTo>
+                <a:cubicBezTo>
+                  <a:pt x="1548" y="3467"/>
+                  <a:pt x="1036" y="4753"/>
+                  <a:pt x="1036" y="6098"/>
+                </a:cubicBezTo>
+                <a:cubicBezTo>
+                  <a:pt x="1036" y="8885"/>
+                  <a:pt x="3310" y="11182"/>
+                  <a:pt x="6120" y="11182"/>
+                </a:cubicBezTo>
+                <a:cubicBezTo>
+                  <a:pt x="7573" y="11182"/>
+                  <a:pt x="8918" y="10575"/>
+                  <a:pt x="9882" y="9516"/>
+                </a:cubicBezTo>
+                <a:lnTo>
+                  <a:pt x="10240" y="9813"/>
+                </a:lnTo>
+                <a:cubicBezTo>
+                  <a:pt x="10347" y="9908"/>
+                  <a:pt x="10466" y="9944"/>
+                  <a:pt x="10597" y="9944"/>
+                </a:cubicBezTo>
+                <a:lnTo>
+                  <a:pt x="10656" y="9944"/>
+                </a:lnTo>
+                <a:cubicBezTo>
+                  <a:pt x="10811" y="9932"/>
+                  <a:pt x="10942" y="9837"/>
+                  <a:pt x="11037" y="9718"/>
+                </a:cubicBezTo>
+                <a:cubicBezTo>
+                  <a:pt x="11823" y="8670"/>
+                  <a:pt x="12228" y="7420"/>
+                  <a:pt x="12228" y="6098"/>
+                </a:cubicBezTo>
+                <a:cubicBezTo>
+                  <a:pt x="12228" y="2884"/>
+                  <a:pt x="9692" y="205"/>
+                  <a:pt x="6465" y="2"/>
+                </a:cubicBezTo>
+                <a:cubicBezTo>
+                  <a:pt x="6453" y="1"/>
+                  <a:pt x="6441" y="1"/>
+                  <a:pt x="6429" y="1"/>
+                </a:cubicBezTo>
+                <a:close/>
+              </a:path>
+            </a:pathLst>
+          </a:custGeom>
+          <a:solidFill>
+            <a:srgbClr val="657E93"/>
+          </a:solidFill>
+          <a:ln>
+            <a:noFill/>
+          </a:ln>
+        </p:spPr>
+        <p:txBody>
+          <a:bodyPr spcFirstLastPara="1" wrap="square" lIns="91425" tIns="91425" rIns="91425" bIns="91425" anchor="ctr" anchorCtr="0">
+            <a:noAutofit/>
+          </a:bodyPr>
+          <a:lstStyle/>
+          <a:p>
+            <a:pPr marL="0" marR="0" lvl="0" indent="0" algn="l" defTabSz="914400" rtl="0" eaLnBrk="1" fontAlgn="auto" latinLnBrk="0" hangingPunct="1">
+              <a:lnSpc>
+                <a:spcPct val="100000"/>
+              </a:lnSpc>
+              <a:spcBef>
+                <a:spcPts val="0"/>
+              </a:spcBef>
+              <a:spcAft>
+                <a:spcPts val="0"/>
+              </a:spcAft>
+              <a:buClr>
+                <a:srgbClr val="000000"/>
+              </a:buClr>
+              <a:buSzTx/>
+              <a:buFont typeface="Arial"/>
+              <a:buNone/>
+              <a:tabLst/>
+              <a:defRPr/>
+            </a:pPr>
+            <a:endParaRPr kumimoji="0" sz="1400" b="0" i="0" u="none" strike="noStrike" kern="0" cap="none" spc="0" normalizeH="0" baseline="0" noProof="0">
+              <a:ln>
+                <a:noFill/>
+              </a:ln>
+              <a:solidFill>
+                <a:srgbClr val="000000"/>
+              </a:solidFill>
+              <a:effectLst/>
+              <a:uLnTx/>
+              <a:uFillTx/>
+              <a:latin typeface="Arial"/>
+              <a:cs typeface="Arial"/>
+              <a:sym typeface="Arial"/>
+            </a:endParaRPr>
+          </a:p>
+        </p:txBody>
+      </p:sp>
+      <p:pic>
+        <p:nvPicPr>
+          <p:cNvPr id="6" name="Picture 5" descr="A graph of different colored lines&#10;&#10;Description automatically generated with medium confidence">
+            <a:extLst>
+              <a:ext uri="{FF2B5EF4-FFF2-40B4-BE49-F238E27FC236}">
+                <a16:creationId xmlns:a16="http://schemas.microsoft.com/office/drawing/2014/main" id="{40A44EB7-407C-A93A-6072-793386685AB8}"/>
+              </a:ext>
+            </a:extLst>
+          </p:cNvPr>
+          <p:cNvPicPr>
+            <a:picLocks noChangeAspect="1"/>
+          </p:cNvPicPr>
+          <p:nvPr/>
+        </p:nvPicPr>
+        <p:blipFill>
+          <a:blip r:embed="rId2"/>
+          <a:stretch>
+            <a:fillRect/>
+          </a:stretch>
+        </p:blipFill>
+        <p:spPr>
+          <a:xfrm>
+            <a:off x="415111" y="804910"/>
+            <a:ext cx="7670666" cy="2404158"/>
+          </a:xfrm>
+          <a:prstGeom prst="rect">
+            <a:avLst/>
+          </a:prstGeom>
+        </p:spPr>
+      </p:pic>
+      <p:pic>
+        <p:nvPicPr>
+          <p:cNvPr id="13" name="Picture 12" descr="A screenshot of a weather forecast&#10;&#10;Description automatically generated">
+            <a:extLst>
+              <a:ext uri="{FF2B5EF4-FFF2-40B4-BE49-F238E27FC236}">
+                <a16:creationId xmlns:a16="http://schemas.microsoft.com/office/drawing/2014/main" id="{54C5491B-4B30-7FBC-2E84-53AE81B8A83B}"/>
+              </a:ext>
+            </a:extLst>
+          </p:cNvPr>
+          <p:cNvPicPr>
+            <a:picLocks noChangeAspect="1"/>
+          </p:cNvPicPr>
+          <p:nvPr/>
+        </p:nvPicPr>
+        <p:blipFill>
+          <a:blip r:embed="rId3"/>
+          <a:stretch>
+            <a:fillRect/>
+          </a:stretch>
+        </p:blipFill>
+        <p:spPr>
+          <a:xfrm>
+            <a:off x="7637753" y="2817416"/>
+            <a:ext cx="1286589" cy="1344026"/>
+          </a:xfrm>
+          <a:prstGeom prst="rect">
+            <a:avLst/>
+          </a:prstGeom>
+        </p:spPr>
+      </p:pic>
+      <p:pic>
+        <p:nvPicPr>
+          <p:cNvPr id="16" name="Picture 15">
+            <a:extLst>
+              <a:ext uri="{FF2B5EF4-FFF2-40B4-BE49-F238E27FC236}">
+                <a16:creationId xmlns:a16="http://schemas.microsoft.com/office/drawing/2014/main" id="{2D5F0F2D-5BD5-97C0-7EDF-28FCD72D02B6}"/>
+              </a:ext>
+            </a:extLst>
+          </p:cNvPr>
+          <p:cNvPicPr>
+            <a:picLocks noChangeAspect="1"/>
+          </p:cNvPicPr>
+          <p:nvPr/>
+        </p:nvPicPr>
+        <p:blipFill>
+          <a:blip r:embed="rId4"/>
+          <a:stretch>
+            <a:fillRect/>
+          </a:stretch>
+        </p:blipFill>
+        <p:spPr>
+          <a:xfrm>
+            <a:off x="31302" y="4222595"/>
+            <a:ext cx="9081396" cy="624377"/>
+          </a:xfrm>
+          <a:prstGeom prst="rect">
+            <a:avLst/>
+          </a:prstGeom>
+        </p:spPr>
+      </p:pic>
+      <p:sp>
+        <p:nvSpPr>
+          <p:cNvPr id="17" name="Rectangle 16">
+            <a:extLst>
+              <a:ext uri="{FF2B5EF4-FFF2-40B4-BE49-F238E27FC236}">
+                <a16:creationId xmlns:a16="http://schemas.microsoft.com/office/drawing/2014/main" id="{D40893FF-D393-F5B2-80BC-A1F3D1B3A832}"/>
+              </a:ext>
+            </a:extLst>
+          </p:cNvPr>
+          <p:cNvSpPr/>
+          <p:nvPr/>
+        </p:nvSpPr>
+        <p:spPr>
+          <a:xfrm>
+            <a:off x="1174596" y="4181133"/>
+            <a:ext cx="493726" cy="707299"/>
+          </a:xfrm>
+          <a:prstGeom prst="rect">
+            <a:avLst/>
+          </a:prstGeom>
+          <a:noFill/>
+          <a:ln>
+            <a:solidFill>
+              <a:srgbClr val="FF0000"/>
+            </a:solidFill>
+          </a:ln>
+        </p:spPr>
+        <p:style>
+          <a:lnRef idx="2">
+            <a:schemeClr val="accent1">
+              <a:shade val="50000"/>
+            </a:schemeClr>
+          </a:lnRef>
+          <a:fillRef idx="1">
+            <a:schemeClr val="accent1"/>
+          </a:fillRef>
+          <a:effectRef idx="0">
+            <a:schemeClr val="accent1"/>
+          </a:effectRef>
+          <a:fontRef idx="minor">
+            <a:schemeClr val="lt1"/>
+          </a:fontRef>
+        </p:style>
+        <p:txBody>
+          <a:bodyPr rtlCol="0" anchor="ctr"/>
+          <a:lstStyle/>
+          <a:p>
+            <a:pPr algn="ctr"/>
+            <a:endParaRPr lang="en-US"/>
+          </a:p>
+        </p:txBody>
+      </p:sp>
+      <p:sp>
+        <p:nvSpPr>
+          <p:cNvPr id="18" name="Rectangle 17">
+            <a:extLst>
+              <a:ext uri="{FF2B5EF4-FFF2-40B4-BE49-F238E27FC236}">
+                <a16:creationId xmlns:a16="http://schemas.microsoft.com/office/drawing/2014/main" id="{BC3E2DA1-3859-C8A3-0AD6-98DD571665E9}"/>
+              </a:ext>
+            </a:extLst>
+          </p:cNvPr>
+          <p:cNvSpPr/>
+          <p:nvPr/>
+        </p:nvSpPr>
+        <p:spPr>
+          <a:xfrm>
+            <a:off x="3170664" y="4182188"/>
+            <a:ext cx="493726" cy="707299"/>
           </a:xfrm>
           <a:prstGeom prst="rect">
             <a:avLst/>
@@ -17328,7 +18919,7 @@
     </p:spTree>
     <p:extLst>
       <p:ext uri="{BB962C8B-B14F-4D97-AF65-F5344CB8AC3E}">
-        <p14:creationId xmlns:p14="http://schemas.microsoft.com/office/powerpoint/2010/main" val="3146209367"/>
+        <p14:creationId xmlns:p14="http://schemas.microsoft.com/office/powerpoint/2010/main" val="3760948384"/>
       </p:ext>
     </p:extLst>
   </p:cSld>
@@ -17338,7 +18929,941 @@
 </p:sld>
 </file>
 
-<file path=ppt/slides/slide5.xml><?xml version="1.0" encoding="utf-8"?>
+<file path=ppt/slides/slide6.xml><?xml version="1.0" encoding="utf-8"?>
+<p:sld xmlns:a="http://schemas.openxmlformats.org/drawingml/2006/main" xmlns:r="http://schemas.openxmlformats.org/officeDocument/2006/relationships" xmlns:p="http://schemas.openxmlformats.org/presentationml/2006/main">
+  <p:cSld>
+    <p:spTree>
+      <p:nvGrpSpPr>
+        <p:cNvPr id="1" name=""/>
+        <p:cNvGrpSpPr/>
+        <p:nvPr/>
+      </p:nvGrpSpPr>
+      <p:grpSpPr>
+        <a:xfrm>
+          <a:off x="0" y="0"/>
+          <a:ext cx="0" cy="0"/>
+          <a:chOff x="0" y="0"/>
+          <a:chExt cx="0" cy="0"/>
+        </a:xfrm>
+      </p:grpSpPr>
+      <p:sp>
+        <p:nvSpPr>
+          <p:cNvPr id="2" name="Text Placeholder 1">
+            <a:extLst>
+              <a:ext uri="{FF2B5EF4-FFF2-40B4-BE49-F238E27FC236}">
+                <a16:creationId xmlns:a16="http://schemas.microsoft.com/office/drawing/2014/main" id="{905FED31-07B4-FF42-B4DB-0FEAE4C43C31}"/>
+              </a:ext>
+            </a:extLst>
+          </p:cNvPr>
+          <p:cNvSpPr>
+            <a:spLocks noGrp="1"/>
+          </p:cNvSpPr>
+          <p:nvPr>
+            <p:ph type="body" idx="1"/>
+          </p:nvPr>
+        </p:nvSpPr>
+        <p:spPr>
+          <a:xfrm>
+            <a:off x="323735" y="928572"/>
+            <a:ext cx="7214392" cy="3918400"/>
+          </a:xfrm>
+        </p:spPr>
+        <p:txBody>
+          <a:bodyPr/>
+          <a:lstStyle/>
+          <a:p>
+            <a:r>
+              <a:rPr lang="en-US" sz="1600" b="1" dirty="0"/>
+              <a:t>Historical Naïve</a:t>
+            </a:r>
+          </a:p>
+          <a:p>
+            <a:endParaRPr lang="en-US" sz="1600" dirty="0"/>
+          </a:p>
+          <a:p>
+            <a:endParaRPr lang="en-US" sz="1600" dirty="0"/>
+          </a:p>
+          <a:p>
+            <a:endParaRPr lang="en-US" sz="1600" dirty="0"/>
+          </a:p>
+          <a:p>
+            <a:r>
+              <a:rPr lang="en-US" sz="1600" b="1" dirty="0"/>
+              <a:t>Seasonal Naive</a:t>
+            </a:r>
+          </a:p>
+          <a:p>
+            <a:endParaRPr lang="en-US" sz="1600" dirty="0"/>
+          </a:p>
+          <a:p>
+            <a:endParaRPr lang="en-US" sz="1600" dirty="0"/>
+          </a:p>
+          <a:p>
+            <a:endParaRPr lang="en-US" sz="1600" dirty="0"/>
+          </a:p>
+          <a:p>
+            <a:r>
+              <a:rPr lang="en-US" sz="1600" b="1" dirty="0"/>
+              <a:t>Exponential Smoothing</a:t>
+            </a:r>
+          </a:p>
+          <a:p>
+            <a:endParaRPr lang="en-US" sz="1600" dirty="0"/>
+          </a:p>
+          <a:p>
+            <a:endParaRPr lang="en-US" sz="1600" dirty="0"/>
+          </a:p>
+          <a:p>
+            <a:endParaRPr lang="en-US" sz="1600" dirty="0"/>
+          </a:p>
+          <a:p>
+            <a:r>
+              <a:rPr lang="en-US" sz="1600" b="1" dirty="0"/>
+              <a:t>Auto-Arima</a:t>
+            </a:r>
+            <a:r>
+              <a:rPr lang="en-US" sz="1600" dirty="0"/>
+              <a:t> (without exogenous features)</a:t>
+            </a:r>
+          </a:p>
+          <a:p>
+            <a:endParaRPr lang="en-US" sz="1600" dirty="0"/>
+          </a:p>
+          <a:p>
+            <a:endParaRPr lang="en-US" sz="1600" dirty="0"/>
+          </a:p>
+          <a:p>
+            <a:pPr marL="114300" indent="0">
+              <a:buNone/>
+            </a:pPr>
+            <a:endParaRPr lang="en-US" sz="1600" dirty="0"/>
+          </a:p>
+          <a:p>
+            <a:endParaRPr lang="en-US" sz="1600" dirty="0"/>
+          </a:p>
+          <a:p>
+            <a:endParaRPr lang="en-US" sz="1600" dirty="0"/>
+          </a:p>
+          <a:p>
+            <a:endParaRPr lang="en-US" sz="1600" dirty="0"/>
+          </a:p>
+        </p:txBody>
+      </p:sp>
+      <p:sp>
+        <p:nvSpPr>
+          <p:cNvPr id="3" name="Title 2">
+            <a:extLst>
+              <a:ext uri="{FF2B5EF4-FFF2-40B4-BE49-F238E27FC236}">
+                <a16:creationId xmlns:a16="http://schemas.microsoft.com/office/drawing/2014/main" id="{355CFEDD-4D85-A24A-A106-2EA1B9050711}"/>
+              </a:ext>
+            </a:extLst>
+          </p:cNvPr>
+          <p:cNvSpPr>
+            <a:spLocks noGrp="1"/>
+          </p:cNvSpPr>
+          <p:nvPr>
+            <p:ph type="ctrTitle"/>
+          </p:nvPr>
+        </p:nvSpPr>
+        <p:spPr>
+          <a:xfrm>
+            <a:off x="227383" y="92762"/>
+            <a:ext cx="5709545" cy="677106"/>
+          </a:xfrm>
+        </p:spPr>
+        <p:txBody>
+          <a:bodyPr/>
+          <a:lstStyle/>
+          <a:p>
+            <a:r>
+              <a:rPr lang="en" sz="2000" b="1" u="sng" dirty="0"/>
+              <a:t>Baseline Projection perform</a:t>
+            </a:r>
+            <a:r>
+              <a:rPr lang="en-US" sz="2000" b="1" u="sng" dirty="0"/>
+              <a:t>a</a:t>
+            </a:r>
+            <a:r>
+              <a:rPr lang="en" sz="2000" b="1" u="sng" dirty="0"/>
+              <a:t>nce for 2024</a:t>
+            </a:r>
+            <a:endParaRPr lang="en-US" sz="2000" b="1" dirty="0"/>
+          </a:p>
+        </p:txBody>
+      </p:sp>
+      <p:pic>
+        <p:nvPicPr>
+          <p:cNvPr id="5" name="Picture 4">
+            <a:extLst>
+              <a:ext uri="{FF2B5EF4-FFF2-40B4-BE49-F238E27FC236}">
+                <a16:creationId xmlns:a16="http://schemas.microsoft.com/office/drawing/2014/main" id="{D164F72C-234C-0264-4AAA-818DD12E3363}"/>
+              </a:ext>
+            </a:extLst>
+          </p:cNvPr>
+          <p:cNvPicPr>
+            <a:picLocks noChangeAspect="1"/>
+          </p:cNvPicPr>
+          <p:nvPr/>
+        </p:nvPicPr>
+        <p:blipFill>
+          <a:blip r:embed="rId2"/>
+          <a:stretch>
+            <a:fillRect/>
+          </a:stretch>
+        </p:blipFill>
+        <p:spPr>
+          <a:xfrm>
+            <a:off x="438615" y="4293958"/>
+            <a:ext cx="7772400" cy="517298"/>
+          </a:xfrm>
+          <a:prstGeom prst="rect">
+            <a:avLst/>
+          </a:prstGeom>
+        </p:spPr>
+      </p:pic>
+      <p:pic>
+        <p:nvPicPr>
+          <p:cNvPr id="8" name="Picture 7">
+            <a:extLst>
+              <a:ext uri="{FF2B5EF4-FFF2-40B4-BE49-F238E27FC236}">
+                <a16:creationId xmlns:a16="http://schemas.microsoft.com/office/drawing/2014/main" id="{7E8E3528-721B-DCFA-7973-4ACE58325FCE}"/>
+              </a:ext>
+            </a:extLst>
+          </p:cNvPr>
+          <p:cNvPicPr>
+            <a:picLocks noChangeAspect="1"/>
+          </p:cNvPicPr>
+          <p:nvPr/>
+        </p:nvPicPr>
+        <p:blipFill>
+          <a:blip r:embed="rId3"/>
+          <a:stretch>
+            <a:fillRect/>
+          </a:stretch>
+        </p:blipFill>
+        <p:spPr>
+          <a:xfrm>
+            <a:off x="438615" y="1313884"/>
+            <a:ext cx="7772400" cy="495425"/>
+          </a:xfrm>
+          <a:prstGeom prst="rect">
+            <a:avLst/>
+          </a:prstGeom>
+        </p:spPr>
+      </p:pic>
+      <p:pic>
+        <p:nvPicPr>
+          <p:cNvPr id="10" name="Picture 9">
+            <a:extLst>
+              <a:ext uri="{FF2B5EF4-FFF2-40B4-BE49-F238E27FC236}">
+                <a16:creationId xmlns:a16="http://schemas.microsoft.com/office/drawing/2014/main" id="{600BE00C-531E-AA50-1477-8178AC4B8ACF}"/>
+              </a:ext>
+            </a:extLst>
+          </p:cNvPr>
+          <p:cNvPicPr>
+            <a:picLocks noChangeAspect="1"/>
+          </p:cNvPicPr>
+          <p:nvPr/>
+        </p:nvPicPr>
+        <p:blipFill>
+          <a:blip r:embed="rId4"/>
+          <a:stretch>
+            <a:fillRect/>
+          </a:stretch>
+        </p:blipFill>
+        <p:spPr>
+          <a:xfrm>
+            <a:off x="438615" y="3290233"/>
+            <a:ext cx="7772400" cy="509137"/>
+          </a:xfrm>
+          <a:prstGeom prst="rect">
+            <a:avLst/>
+          </a:prstGeom>
+        </p:spPr>
+      </p:pic>
+      <p:pic>
+        <p:nvPicPr>
+          <p:cNvPr id="12" name="Picture 11">
+            <a:extLst>
+              <a:ext uri="{FF2B5EF4-FFF2-40B4-BE49-F238E27FC236}">
+                <a16:creationId xmlns:a16="http://schemas.microsoft.com/office/drawing/2014/main" id="{A41E3C4A-8DED-93A6-71D5-E81113387FD9}"/>
+              </a:ext>
+            </a:extLst>
+          </p:cNvPr>
+          <p:cNvPicPr>
+            <a:picLocks noChangeAspect="1"/>
+          </p:cNvPicPr>
+          <p:nvPr/>
+        </p:nvPicPr>
+        <p:blipFill>
+          <a:blip r:embed="rId5"/>
+          <a:stretch>
+            <a:fillRect/>
+          </a:stretch>
+        </p:blipFill>
+        <p:spPr>
+          <a:xfrm>
+            <a:off x="438615" y="2337198"/>
+            <a:ext cx="7772400" cy="480097"/>
+          </a:xfrm>
+          <a:prstGeom prst="rect">
+            <a:avLst/>
+          </a:prstGeom>
+        </p:spPr>
+      </p:pic>
+      <p:sp>
+        <p:nvSpPr>
+          <p:cNvPr id="14" name="Down Arrow 13">
+            <a:extLst>
+              <a:ext uri="{FF2B5EF4-FFF2-40B4-BE49-F238E27FC236}">
+                <a16:creationId xmlns:a16="http://schemas.microsoft.com/office/drawing/2014/main" id="{E94B9545-11EB-B72C-5A1E-718FCF4C08B1}"/>
+              </a:ext>
+            </a:extLst>
+          </p:cNvPr>
+          <p:cNvSpPr/>
+          <p:nvPr/>
+        </p:nvSpPr>
+        <p:spPr>
+          <a:xfrm>
+            <a:off x="7285464" y="1879382"/>
+            <a:ext cx="304800" cy="367149"/>
+          </a:xfrm>
+          <a:prstGeom prst="downArrow">
+            <a:avLst/>
+          </a:prstGeom>
+        </p:spPr>
+        <p:style>
+          <a:lnRef idx="2">
+            <a:schemeClr val="accent1">
+              <a:shade val="15000"/>
+            </a:schemeClr>
+          </a:lnRef>
+          <a:fillRef idx="1">
+            <a:schemeClr val="accent1"/>
+          </a:fillRef>
+          <a:effectRef idx="0">
+            <a:schemeClr val="accent1"/>
+          </a:effectRef>
+          <a:fontRef idx="minor">
+            <a:schemeClr val="lt1"/>
+          </a:fontRef>
+        </p:style>
+        <p:txBody>
+          <a:bodyPr rtlCol="0" anchor="ctr"/>
+          <a:lstStyle/>
+          <a:p>
+            <a:pPr algn="ctr"/>
+            <a:endParaRPr lang="en-US"/>
+          </a:p>
+        </p:txBody>
+      </p:sp>
+      <p:sp>
+        <p:nvSpPr>
+          <p:cNvPr id="15" name="Down Arrow 14">
+            <a:extLst>
+              <a:ext uri="{FF2B5EF4-FFF2-40B4-BE49-F238E27FC236}">
+                <a16:creationId xmlns:a16="http://schemas.microsoft.com/office/drawing/2014/main" id="{526D2863-4425-4812-D286-A2FBE9EC6C96}"/>
+              </a:ext>
+            </a:extLst>
+          </p:cNvPr>
+          <p:cNvSpPr/>
+          <p:nvPr/>
+        </p:nvSpPr>
+        <p:spPr>
+          <a:xfrm>
+            <a:off x="7285464" y="2887368"/>
+            <a:ext cx="304800" cy="367149"/>
+          </a:xfrm>
+          <a:prstGeom prst="downArrow">
+            <a:avLst/>
+          </a:prstGeom>
+        </p:spPr>
+        <p:style>
+          <a:lnRef idx="2">
+            <a:schemeClr val="accent1">
+              <a:shade val="15000"/>
+            </a:schemeClr>
+          </a:lnRef>
+          <a:fillRef idx="1">
+            <a:schemeClr val="accent1"/>
+          </a:fillRef>
+          <a:effectRef idx="0">
+            <a:schemeClr val="accent1"/>
+          </a:effectRef>
+          <a:fontRef idx="minor">
+            <a:schemeClr val="lt1"/>
+          </a:fontRef>
+        </p:style>
+        <p:txBody>
+          <a:bodyPr rtlCol="0" anchor="ctr"/>
+          <a:lstStyle/>
+          <a:p>
+            <a:pPr algn="ctr"/>
+            <a:endParaRPr lang="en-US"/>
+          </a:p>
+        </p:txBody>
+      </p:sp>
+      <p:sp>
+        <p:nvSpPr>
+          <p:cNvPr id="17" name="Down Arrow 16">
+            <a:extLst>
+              <a:ext uri="{FF2B5EF4-FFF2-40B4-BE49-F238E27FC236}">
+                <a16:creationId xmlns:a16="http://schemas.microsoft.com/office/drawing/2014/main" id="{631B0328-4F1B-B969-701F-36EA493EAA9D}"/>
+              </a:ext>
+            </a:extLst>
+          </p:cNvPr>
+          <p:cNvSpPr/>
+          <p:nvPr/>
+        </p:nvSpPr>
+        <p:spPr>
+          <a:xfrm>
+            <a:off x="7292899" y="3877668"/>
+            <a:ext cx="304800" cy="367149"/>
+          </a:xfrm>
+          <a:prstGeom prst="downArrow">
+            <a:avLst/>
+          </a:prstGeom>
+        </p:spPr>
+        <p:style>
+          <a:lnRef idx="2">
+            <a:schemeClr val="accent1">
+              <a:shade val="15000"/>
+            </a:schemeClr>
+          </a:lnRef>
+          <a:fillRef idx="1">
+            <a:schemeClr val="accent1"/>
+          </a:fillRef>
+          <a:effectRef idx="0">
+            <a:schemeClr val="accent1"/>
+          </a:effectRef>
+          <a:fontRef idx="minor">
+            <a:schemeClr val="lt1"/>
+          </a:fontRef>
+        </p:style>
+        <p:txBody>
+          <a:bodyPr rtlCol="0" anchor="ctr"/>
+          <a:lstStyle/>
+          <a:p>
+            <a:pPr algn="ctr"/>
+            <a:endParaRPr lang="en-US"/>
+          </a:p>
+        </p:txBody>
+      </p:sp>
+      <p:sp>
+        <p:nvSpPr>
+          <p:cNvPr id="18" name="TextBox 17">
+            <a:extLst>
+              <a:ext uri="{FF2B5EF4-FFF2-40B4-BE49-F238E27FC236}">
+                <a16:creationId xmlns:a16="http://schemas.microsoft.com/office/drawing/2014/main" id="{80DE6C0C-4CB8-2256-1022-915414B2A2B2}"/>
+              </a:ext>
+            </a:extLst>
+          </p:cNvPr>
+          <p:cNvSpPr txBox="1"/>
+          <p:nvPr/>
+        </p:nvSpPr>
+        <p:spPr>
+          <a:xfrm>
+            <a:off x="6843894" y="12641"/>
+            <a:ext cx="2426487" cy="692497"/>
+          </a:xfrm>
+          <a:prstGeom prst="rect">
+            <a:avLst/>
+          </a:prstGeom>
+          <a:noFill/>
+        </p:spPr>
+        <p:txBody>
+          <a:bodyPr wrap="square" rtlCol="0">
+            <a:spAutoFit/>
+          </a:bodyPr>
+          <a:lstStyle/>
+          <a:p>
+            <a:r>
+              <a:rPr lang="en-US" sz="1100" b="1" dirty="0">
+                <a:solidFill>
+                  <a:schemeClr val="bg1"/>
+                </a:solidFill>
+              </a:rPr>
+              <a:t>Take away:</a:t>
+            </a:r>
+          </a:p>
+          <a:p>
+            <a:r>
+              <a:rPr lang="en-US" sz="900" dirty="0">
+                <a:solidFill>
+                  <a:schemeClr val="bg1"/>
+                </a:solidFill>
+              </a:rPr>
+              <a:t>The clear increase in forecasting performance by using better sophisticated model.</a:t>
+            </a:r>
+          </a:p>
+        </p:txBody>
+      </p:sp>
+      <p:sp>
+        <p:nvSpPr>
+          <p:cNvPr id="19" name="Google Shape;11345;p60">
+            <a:extLst>
+              <a:ext uri="{FF2B5EF4-FFF2-40B4-BE49-F238E27FC236}">
+                <a16:creationId xmlns:a16="http://schemas.microsoft.com/office/drawing/2014/main" id="{B698433A-63A7-CFBB-BC6F-000CB4BB764C}"/>
+              </a:ext>
+            </a:extLst>
+          </p:cNvPr>
+          <p:cNvSpPr/>
+          <p:nvPr/>
+        </p:nvSpPr>
+        <p:spPr>
+          <a:xfrm>
+            <a:off x="4787591" y="307638"/>
+            <a:ext cx="472797" cy="428278"/>
+          </a:xfrm>
+          <a:custGeom>
+            <a:avLst/>
+            <a:gdLst/>
+            <a:ahLst/>
+            <a:cxnLst/>
+            <a:rect l="l" t="t" r="r" b="b"/>
+            <a:pathLst>
+              <a:path w="12228" h="11183" extrusionOk="0">
+                <a:moveTo>
+                  <a:pt x="4560" y="3991"/>
+                </a:moveTo>
+                <a:cubicBezTo>
+                  <a:pt x="4739" y="3991"/>
+                  <a:pt x="4894" y="4146"/>
+                  <a:pt x="4894" y="4324"/>
+                </a:cubicBezTo>
+                <a:cubicBezTo>
+                  <a:pt x="4894" y="4503"/>
+                  <a:pt x="4739" y="4646"/>
+                  <a:pt x="4560" y="4646"/>
+                </a:cubicBezTo>
+                <a:cubicBezTo>
+                  <a:pt x="4382" y="4646"/>
+                  <a:pt x="4239" y="4503"/>
+                  <a:pt x="4239" y="4324"/>
+                </a:cubicBezTo>
+                <a:cubicBezTo>
+                  <a:pt x="4251" y="4134"/>
+                  <a:pt x="4382" y="3991"/>
+                  <a:pt x="4560" y="3991"/>
+                </a:cubicBezTo>
+                <a:close/>
+                <a:moveTo>
+                  <a:pt x="5930" y="1419"/>
+                </a:moveTo>
+                <a:lnTo>
+                  <a:pt x="5930" y="2003"/>
+                </a:lnTo>
+                <a:lnTo>
+                  <a:pt x="5941" y="4051"/>
+                </a:lnTo>
+                <a:lnTo>
+                  <a:pt x="5965" y="5872"/>
+                </a:lnTo>
+                <a:lnTo>
+                  <a:pt x="1619" y="4908"/>
+                </a:lnTo>
+                <a:cubicBezTo>
+                  <a:pt x="1869" y="3801"/>
+                  <a:pt x="2548" y="2848"/>
+                  <a:pt x="3489" y="2229"/>
+                </a:cubicBezTo>
+                <a:lnTo>
+                  <a:pt x="4275" y="3670"/>
+                </a:lnTo>
+                <a:cubicBezTo>
+                  <a:pt x="4025" y="3777"/>
+                  <a:pt x="3858" y="4027"/>
+                  <a:pt x="3858" y="4313"/>
+                </a:cubicBezTo>
+                <a:cubicBezTo>
+                  <a:pt x="3858" y="4694"/>
+                  <a:pt x="4179" y="5027"/>
+                  <a:pt x="4572" y="5027"/>
+                </a:cubicBezTo>
+                <a:cubicBezTo>
+                  <a:pt x="4965" y="5027"/>
+                  <a:pt x="5287" y="4705"/>
+                  <a:pt x="5287" y="4313"/>
+                </a:cubicBezTo>
+                <a:cubicBezTo>
+                  <a:pt x="5287" y="3967"/>
+                  <a:pt x="5037" y="3670"/>
+                  <a:pt x="4715" y="3610"/>
+                </a:cubicBezTo>
+                <a:lnTo>
+                  <a:pt x="3846" y="2015"/>
+                </a:lnTo>
+                <a:cubicBezTo>
+                  <a:pt x="4477" y="1657"/>
+                  <a:pt x="5168" y="1455"/>
+                  <a:pt x="5930" y="1419"/>
+                </a:cubicBezTo>
+                <a:close/>
+                <a:moveTo>
+                  <a:pt x="6287" y="4265"/>
+                </a:moveTo>
+                <a:cubicBezTo>
+                  <a:pt x="7227" y="4348"/>
+                  <a:pt x="7965" y="5158"/>
+                  <a:pt x="7965" y="6122"/>
+                </a:cubicBezTo>
+                <a:cubicBezTo>
+                  <a:pt x="7965" y="6491"/>
+                  <a:pt x="7846" y="6872"/>
+                  <a:pt x="7644" y="7170"/>
+                </a:cubicBezTo>
+                <a:lnTo>
+                  <a:pt x="6287" y="6039"/>
+                </a:lnTo>
+                <a:lnTo>
+                  <a:pt x="6287" y="4265"/>
+                </a:lnTo>
+                <a:close/>
+                <a:moveTo>
+                  <a:pt x="6477" y="348"/>
+                </a:moveTo>
+                <a:cubicBezTo>
+                  <a:pt x="9501" y="526"/>
+                  <a:pt x="11871" y="3039"/>
+                  <a:pt x="11871" y="6063"/>
+                </a:cubicBezTo>
+                <a:cubicBezTo>
+                  <a:pt x="11835" y="7349"/>
+                  <a:pt x="11454" y="8539"/>
+                  <a:pt x="10728" y="9516"/>
+                </a:cubicBezTo>
+                <a:cubicBezTo>
+                  <a:pt x="10692" y="9563"/>
+                  <a:pt x="10644" y="9575"/>
+                  <a:pt x="10609" y="9575"/>
+                </a:cubicBezTo>
+                <a:cubicBezTo>
+                  <a:pt x="10561" y="9575"/>
+                  <a:pt x="10513" y="9563"/>
+                  <a:pt x="10490" y="9527"/>
+                </a:cubicBezTo>
+                <a:lnTo>
+                  <a:pt x="9537" y="8730"/>
+                </a:lnTo>
+                <a:cubicBezTo>
+                  <a:pt x="10013" y="8123"/>
+                  <a:pt x="10311" y="7384"/>
+                  <a:pt x="10394" y="6610"/>
+                </a:cubicBezTo>
+                <a:cubicBezTo>
+                  <a:pt x="10406" y="6491"/>
+                  <a:pt x="10323" y="6396"/>
+                  <a:pt x="10204" y="6396"/>
+                </a:cubicBezTo>
+                <a:cubicBezTo>
+                  <a:pt x="10097" y="6396"/>
+                  <a:pt x="10025" y="6468"/>
+                  <a:pt x="10013" y="6551"/>
+                </a:cubicBezTo>
+                <a:cubicBezTo>
+                  <a:pt x="9930" y="7206"/>
+                  <a:pt x="9680" y="7849"/>
+                  <a:pt x="9299" y="8384"/>
+                </a:cubicBezTo>
+                <a:cubicBezTo>
+                  <a:pt x="9275" y="8396"/>
+                  <a:pt x="9263" y="8432"/>
+                  <a:pt x="9251" y="8444"/>
+                </a:cubicBezTo>
+                <a:cubicBezTo>
+                  <a:pt x="9251" y="8444"/>
+                  <a:pt x="9251" y="8456"/>
+                  <a:pt x="9239" y="8456"/>
+                </a:cubicBezTo>
+                <a:lnTo>
+                  <a:pt x="7954" y="7372"/>
+                </a:lnTo>
+                <a:cubicBezTo>
+                  <a:pt x="8227" y="7003"/>
+                  <a:pt x="8370" y="6539"/>
+                  <a:pt x="8370" y="6075"/>
+                </a:cubicBezTo>
+                <a:cubicBezTo>
+                  <a:pt x="8370" y="4908"/>
+                  <a:pt x="7465" y="3920"/>
+                  <a:pt x="6299" y="3836"/>
+                </a:cubicBezTo>
+                <a:lnTo>
+                  <a:pt x="6287" y="2146"/>
+                </a:lnTo>
+                <a:lnTo>
+                  <a:pt x="6418" y="2146"/>
+                </a:lnTo>
+                <a:cubicBezTo>
+                  <a:pt x="6453" y="2146"/>
+                  <a:pt x="6501" y="2146"/>
+                  <a:pt x="6525" y="2169"/>
+                </a:cubicBezTo>
+                <a:cubicBezTo>
+                  <a:pt x="8358" y="2360"/>
+                  <a:pt x="9811" y="3812"/>
+                  <a:pt x="10025" y="5646"/>
+                </a:cubicBezTo>
+                <a:cubicBezTo>
+                  <a:pt x="10037" y="5753"/>
+                  <a:pt x="10109" y="5813"/>
+                  <a:pt x="10216" y="5813"/>
+                </a:cubicBezTo>
+                <a:cubicBezTo>
+                  <a:pt x="10335" y="5813"/>
+                  <a:pt x="10430" y="5706"/>
+                  <a:pt x="10406" y="5598"/>
+                </a:cubicBezTo>
+                <a:cubicBezTo>
+                  <a:pt x="10192" y="3503"/>
+                  <a:pt x="8430" y="1848"/>
+                  <a:pt x="6299" y="1765"/>
+                </a:cubicBezTo>
+                <a:lnTo>
+                  <a:pt x="6299" y="526"/>
+                </a:lnTo>
+                <a:cubicBezTo>
+                  <a:pt x="6299" y="479"/>
+                  <a:pt x="6322" y="443"/>
+                  <a:pt x="6346" y="407"/>
+                </a:cubicBezTo>
+                <a:cubicBezTo>
+                  <a:pt x="6382" y="360"/>
+                  <a:pt x="6418" y="348"/>
+                  <a:pt x="6477" y="348"/>
+                </a:cubicBezTo>
+                <a:close/>
+                <a:moveTo>
+                  <a:pt x="1477" y="5277"/>
+                </a:moveTo>
+                <a:lnTo>
+                  <a:pt x="5870" y="6241"/>
+                </a:lnTo>
+                <a:lnTo>
+                  <a:pt x="4667" y="10575"/>
+                </a:lnTo>
+                <a:cubicBezTo>
+                  <a:pt x="2774" y="9980"/>
+                  <a:pt x="1405" y="8206"/>
+                  <a:pt x="1405" y="6110"/>
+                </a:cubicBezTo>
+                <a:cubicBezTo>
+                  <a:pt x="1405" y="5825"/>
+                  <a:pt x="1441" y="5539"/>
+                  <a:pt x="1477" y="5277"/>
+                </a:cubicBezTo>
+                <a:close/>
+                <a:moveTo>
+                  <a:pt x="6215" y="6468"/>
+                </a:moveTo>
+                <a:lnTo>
+                  <a:pt x="7549" y="7599"/>
+                </a:lnTo>
+                <a:lnTo>
+                  <a:pt x="9132" y="8920"/>
+                </a:lnTo>
+                <a:lnTo>
+                  <a:pt x="9573" y="9289"/>
+                </a:lnTo>
+                <a:cubicBezTo>
+                  <a:pt x="8680" y="10266"/>
+                  <a:pt x="7430" y="10813"/>
+                  <a:pt x="6108" y="10813"/>
+                </a:cubicBezTo>
+                <a:cubicBezTo>
+                  <a:pt x="5739" y="10813"/>
+                  <a:pt x="5382" y="10766"/>
+                  <a:pt x="5037" y="10694"/>
+                </a:cubicBezTo>
+                <a:lnTo>
+                  <a:pt x="6215" y="6468"/>
+                </a:lnTo>
+                <a:close/>
+                <a:moveTo>
+                  <a:pt x="6429" y="1"/>
+                </a:moveTo>
+                <a:cubicBezTo>
+                  <a:pt x="6297" y="1"/>
+                  <a:pt x="6159" y="59"/>
+                  <a:pt x="6060" y="157"/>
+                </a:cubicBezTo>
+                <a:cubicBezTo>
+                  <a:pt x="5953" y="264"/>
+                  <a:pt x="5882" y="407"/>
+                  <a:pt x="5882" y="562"/>
+                </a:cubicBezTo>
+                <a:lnTo>
+                  <a:pt x="5882" y="1038"/>
+                </a:lnTo>
+                <a:cubicBezTo>
+                  <a:pt x="5084" y="1062"/>
+                  <a:pt x="4310" y="1288"/>
+                  <a:pt x="3620" y="1669"/>
+                </a:cubicBezTo>
+                <a:lnTo>
+                  <a:pt x="3191" y="872"/>
+                </a:lnTo>
+                <a:cubicBezTo>
+                  <a:pt x="3155" y="812"/>
+                  <a:pt x="3084" y="764"/>
+                  <a:pt x="3024" y="764"/>
+                </a:cubicBezTo>
+                <a:lnTo>
+                  <a:pt x="393" y="764"/>
+                </a:lnTo>
+                <a:lnTo>
+                  <a:pt x="393" y="443"/>
+                </a:lnTo>
+                <a:cubicBezTo>
+                  <a:pt x="393" y="336"/>
+                  <a:pt x="298" y="241"/>
+                  <a:pt x="203" y="241"/>
+                </a:cubicBezTo>
+                <a:cubicBezTo>
+                  <a:pt x="95" y="241"/>
+                  <a:pt x="0" y="336"/>
+                  <a:pt x="0" y="443"/>
+                </a:cubicBezTo>
+                <a:lnTo>
+                  <a:pt x="0" y="1467"/>
+                </a:lnTo>
+                <a:cubicBezTo>
+                  <a:pt x="0" y="1574"/>
+                  <a:pt x="95" y="1657"/>
+                  <a:pt x="203" y="1657"/>
+                </a:cubicBezTo>
+                <a:cubicBezTo>
+                  <a:pt x="298" y="1657"/>
+                  <a:pt x="393" y="1562"/>
+                  <a:pt x="393" y="1467"/>
+                </a:cubicBezTo>
+                <a:lnTo>
+                  <a:pt x="393" y="1157"/>
+                </a:lnTo>
+                <a:lnTo>
+                  <a:pt x="2917" y="1157"/>
+                </a:lnTo>
+                <a:lnTo>
+                  <a:pt x="3310" y="1872"/>
+                </a:lnTo>
+                <a:cubicBezTo>
+                  <a:pt x="3024" y="2062"/>
+                  <a:pt x="2762" y="2277"/>
+                  <a:pt x="2501" y="2527"/>
+                </a:cubicBezTo>
+                <a:cubicBezTo>
+                  <a:pt x="1548" y="3467"/>
+                  <a:pt x="1036" y="4753"/>
+                  <a:pt x="1036" y="6098"/>
+                </a:cubicBezTo>
+                <a:cubicBezTo>
+                  <a:pt x="1036" y="8885"/>
+                  <a:pt x="3310" y="11182"/>
+                  <a:pt x="6120" y="11182"/>
+                </a:cubicBezTo>
+                <a:cubicBezTo>
+                  <a:pt x="7573" y="11182"/>
+                  <a:pt x="8918" y="10575"/>
+                  <a:pt x="9882" y="9516"/>
+                </a:cubicBezTo>
+                <a:lnTo>
+                  <a:pt x="10240" y="9813"/>
+                </a:lnTo>
+                <a:cubicBezTo>
+                  <a:pt x="10347" y="9908"/>
+                  <a:pt x="10466" y="9944"/>
+                  <a:pt x="10597" y="9944"/>
+                </a:cubicBezTo>
+                <a:lnTo>
+                  <a:pt x="10656" y="9944"/>
+                </a:lnTo>
+                <a:cubicBezTo>
+                  <a:pt x="10811" y="9932"/>
+                  <a:pt x="10942" y="9837"/>
+                  <a:pt x="11037" y="9718"/>
+                </a:cubicBezTo>
+                <a:cubicBezTo>
+                  <a:pt x="11823" y="8670"/>
+                  <a:pt x="12228" y="7420"/>
+                  <a:pt x="12228" y="6098"/>
+                </a:cubicBezTo>
+                <a:cubicBezTo>
+                  <a:pt x="12228" y="2884"/>
+                  <a:pt x="9692" y="205"/>
+                  <a:pt x="6465" y="2"/>
+                </a:cubicBezTo>
+                <a:cubicBezTo>
+                  <a:pt x="6453" y="1"/>
+                  <a:pt x="6441" y="1"/>
+                  <a:pt x="6429" y="1"/>
+                </a:cubicBezTo>
+                <a:close/>
+              </a:path>
+            </a:pathLst>
+          </a:custGeom>
+          <a:solidFill>
+            <a:srgbClr val="657E93"/>
+          </a:solidFill>
+          <a:ln>
+            <a:noFill/>
+          </a:ln>
+        </p:spPr>
+        <p:txBody>
+          <a:bodyPr spcFirstLastPara="1" wrap="square" lIns="91425" tIns="91425" rIns="91425" bIns="91425" anchor="ctr" anchorCtr="0">
+            <a:noAutofit/>
+          </a:bodyPr>
+          <a:lstStyle/>
+          <a:p>
+            <a:pPr marL="0" marR="0" lvl="0" indent="0" algn="l" defTabSz="914400" rtl="0" eaLnBrk="1" fontAlgn="auto" latinLnBrk="0" hangingPunct="1">
+              <a:lnSpc>
+                <a:spcPct val="100000"/>
+              </a:lnSpc>
+              <a:spcBef>
+                <a:spcPts val="0"/>
+              </a:spcBef>
+              <a:spcAft>
+                <a:spcPts val="0"/>
+              </a:spcAft>
+              <a:buClr>
+                <a:srgbClr val="000000"/>
+              </a:buClr>
+              <a:buSzTx/>
+              <a:buFont typeface="Arial"/>
+              <a:buNone/>
+              <a:tabLst/>
+              <a:defRPr/>
+            </a:pPr>
+            <a:endParaRPr kumimoji="0" sz="1400" b="0" i="0" u="none" strike="noStrike" kern="0" cap="none" spc="0" normalizeH="0" baseline="0" noProof="0">
+              <a:ln>
+                <a:noFill/>
+              </a:ln>
+              <a:solidFill>
+                <a:srgbClr val="000000"/>
+              </a:solidFill>
+              <a:effectLst/>
+              <a:uLnTx/>
+              <a:uFillTx/>
+              <a:latin typeface="Arial"/>
+              <a:cs typeface="Arial"/>
+              <a:sym typeface="Arial"/>
+            </a:endParaRPr>
+          </a:p>
+        </p:txBody>
+      </p:sp>
+    </p:spTree>
+    <p:extLst>
+      <p:ext uri="{BB962C8B-B14F-4D97-AF65-F5344CB8AC3E}">
+        <p14:creationId xmlns:p14="http://schemas.microsoft.com/office/powerpoint/2010/main" val="2449734972"/>
+      </p:ext>
+    </p:extLst>
+  </p:cSld>
+  <p:clrMapOvr>
+    <a:masterClrMapping/>
+  </p:clrMapOvr>
+</p:sld>
+</file>
+
+<file path=ppt/slides/slide7.xml><?xml version="1.0" encoding="utf-8"?>
 <p:sld xmlns:a="http://schemas.openxmlformats.org/drawingml/2006/main" xmlns:r="http://schemas.openxmlformats.org/officeDocument/2006/relationships" xmlns:p="http://schemas.openxmlformats.org/presentationml/2006/main">
   <p:cSld>
     <p:spTree>
@@ -17383,7 +19908,7 @@
           <a:p>
             <a:pPr algn="ctr"/>
             <a:r>
-              <a:rPr lang="en-US" b="1" dirty="0"/>
+              <a:rPr lang="en-US" sz="3600" b="1" dirty="0"/>
               <a:t>Appendix</a:t>
             </a:r>
           </a:p>
@@ -17402,25 +19927,12 @@
 </p:sld>
 </file>
 
-<file path=ppt/slides/slide6.xml><?xml version="1.0" encoding="utf-8"?>
+<file path=ppt/slides/slide8.xml><?xml version="1.0" encoding="utf-8"?>
 <p:sld xmlns:a="http://schemas.openxmlformats.org/drawingml/2006/main" xmlns:r="http://schemas.openxmlformats.org/officeDocument/2006/relationships" xmlns:p="http://schemas.openxmlformats.org/presentationml/2006/main">
   <p:cSld>
-    <p:bg>
-      <p:bgPr>
-        <a:blipFill>
-          <a:blip r:embed="rId3">
-            <a:alphaModFix/>
-          </a:blip>
-          <a:stretch>
-            <a:fillRect/>
-          </a:stretch>
-        </a:blipFill>
-        <a:effectLst/>
-      </p:bgPr>
-    </p:bg>
     <p:spTree>
       <p:nvGrpSpPr>
-        <p:cNvPr id="1" name="Shape 1067"/>
+        <p:cNvPr id="1" name=""/>
         <p:cNvGrpSpPr/>
         <p:nvPr/>
       </p:nvGrpSpPr>
@@ -17432,256 +19944,343 @@
           <a:chExt cx="0" cy="0"/>
         </a:xfrm>
       </p:grpSpPr>
-      <p:grpSp>
-        <p:nvGrpSpPr>
-          <p:cNvPr id="1068" name="Google Shape;1068;p36"/>
-          <p:cNvGrpSpPr/>
-          <p:nvPr/>
-        </p:nvGrpSpPr>
-        <p:grpSpPr>
-          <a:xfrm>
-            <a:off x="0" y="2139400"/>
-            <a:ext cx="4962900" cy="3012375"/>
-            <a:chOff x="0" y="2139400"/>
-            <a:chExt cx="4962900" cy="3012375"/>
-          </a:xfrm>
-        </p:grpSpPr>
-        <p:sp>
-          <p:nvSpPr>
-            <p:cNvPr id="1069" name="Google Shape;1069;p36"/>
-            <p:cNvSpPr/>
-            <p:nvPr/>
-          </p:nvSpPr>
-          <p:spPr>
-            <a:xfrm>
-              <a:off x="0" y="3486775"/>
-              <a:ext cx="4038900" cy="1665000"/>
-            </a:xfrm>
-            <a:prstGeom prst="rect">
-              <a:avLst/>
-            </a:prstGeom>
-            <a:solidFill>
-              <a:schemeClr val="accent2"/>
-            </a:solidFill>
-            <a:ln>
-              <a:noFill/>
-            </a:ln>
-          </p:spPr>
-          <p:txBody>
-            <a:bodyPr spcFirstLastPara="1" wrap="square" lIns="91425" tIns="91425" rIns="91425" bIns="91425" anchor="ctr" anchorCtr="0">
-              <a:noAutofit/>
-            </a:bodyPr>
-            <a:lstStyle/>
-            <a:p>
-              <a:pPr marL="0" lvl="0" indent="0" algn="l" rtl="0">
-                <a:spcBef>
-                  <a:spcPts val="0"/>
-                </a:spcBef>
-                <a:spcAft>
-                  <a:spcPts val="0"/>
-                </a:spcAft>
-                <a:buNone/>
-              </a:pPr>
-              <a:endParaRPr/>
-            </a:p>
-          </p:txBody>
-        </p:sp>
-        <p:sp>
-          <p:nvSpPr>
-            <p:cNvPr id="1070" name="Google Shape;1070;p36"/>
-            <p:cNvSpPr/>
-            <p:nvPr/>
-          </p:nvSpPr>
-          <p:spPr>
-            <a:xfrm>
-              <a:off x="4038900" y="4219500"/>
-              <a:ext cx="924000" cy="924000"/>
-            </a:xfrm>
-            <a:prstGeom prst="rect">
-              <a:avLst/>
-            </a:prstGeom>
-            <a:solidFill>
-              <a:schemeClr val="accent1"/>
-            </a:solidFill>
-            <a:ln>
-              <a:noFill/>
-            </a:ln>
-          </p:spPr>
-          <p:txBody>
-            <a:bodyPr spcFirstLastPara="1" wrap="square" lIns="91425" tIns="91425" rIns="91425" bIns="91425" anchor="ctr" anchorCtr="0">
-              <a:noAutofit/>
-            </a:bodyPr>
-            <a:lstStyle/>
-            <a:p>
-              <a:pPr marL="0" lvl="0" indent="0" algn="l" rtl="0">
-                <a:spcBef>
-                  <a:spcPts val="0"/>
-                </a:spcBef>
-                <a:spcAft>
-                  <a:spcPts val="0"/>
-                </a:spcAft>
-                <a:buNone/>
-              </a:pPr>
-              <a:endParaRPr/>
-            </a:p>
-          </p:txBody>
-        </p:sp>
-        <p:grpSp>
-          <p:nvGrpSpPr>
-            <p:cNvPr id="1071" name="Google Shape;1071;p36"/>
-            <p:cNvGrpSpPr/>
-            <p:nvPr/>
-          </p:nvGrpSpPr>
-          <p:grpSpPr>
-            <a:xfrm>
-              <a:off x="0" y="2139400"/>
-              <a:ext cx="1351800" cy="1347375"/>
-              <a:chOff x="0" y="2139400"/>
-              <a:chExt cx="1351800" cy="1347375"/>
-            </a:xfrm>
-          </p:grpSpPr>
-          <p:sp>
-            <p:nvSpPr>
-              <p:cNvPr id="1072" name="Google Shape;1072;p36"/>
-              <p:cNvSpPr/>
-              <p:nvPr/>
-            </p:nvSpPr>
-            <p:spPr>
-              <a:xfrm>
-                <a:off x="0" y="2562775"/>
-                <a:ext cx="924000" cy="924000"/>
-              </a:xfrm>
-              <a:prstGeom prst="rect">
-                <a:avLst/>
-              </a:prstGeom>
-              <a:solidFill>
-                <a:schemeClr val="accent3"/>
-              </a:solidFill>
-              <a:ln>
-                <a:noFill/>
-              </a:ln>
-            </p:spPr>
-            <p:txBody>
-              <a:bodyPr spcFirstLastPara="1" wrap="square" lIns="91425" tIns="91425" rIns="91425" bIns="91425" anchor="ctr" anchorCtr="0">
-                <a:noAutofit/>
-              </a:bodyPr>
-              <a:lstStyle/>
-              <a:p>
-                <a:pPr marL="0" lvl="0" indent="0" algn="l" rtl="0">
-                  <a:spcBef>
-                    <a:spcPts val="0"/>
-                  </a:spcBef>
-                  <a:spcAft>
-                    <a:spcPts val="0"/>
-                  </a:spcAft>
-                  <a:buNone/>
-                </a:pPr>
-                <a:endParaRPr/>
-              </a:p>
-            </p:txBody>
-          </p:sp>
-          <p:sp>
-            <p:nvSpPr>
-              <p:cNvPr id="1073" name="Google Shape;1073;p36"/>
-              <p:cNvSpPr/>
-              <p:nvPr/>
-            </p:nvSpPr>
-            <p:spPr>
-              <a:xfrm>
-                <a:off x="924000" y="2139400"/>
-                <a:ext cx="427800" cy="427800"/>
-              </a:xfrm>
-              <a:prstGeom prst="rect">
-                <a:avLst/>
-              </a:prstGeom>
-              <a:solidFill>
-                <a:schemeClr val="accent2"/>
-              </a:solidFill>
-              <a:ln>
-                <a:noFill/>
-              </a:ln>
-            </p:spPr>
-            <p:txBody>
-              <a:bodyPr spcFirstLastPara="1" wrap="square" lIns="91425" tIns="91425" rIns="91425" bIns="91425" anchor="ctr" anchorCtr="0">
-                <a:noAutofit/>
-              </a:bodyPr>
-              <a:lstStyle/>
-              <a:p>
-                <a:pPr marL="0" lvl="0" indent="0" algn="l" rtl="0">
-                  <a:spcBef>
-                    <a:spcPts val="0"/>
-                  </a:spcBef>
-                  <a:spcAft>
-                    <a:spcPts val="0"/>
-                  </a:spcAft>
-                  <a:buNone/>
-                </a:pPr>
-                <a:endParaRPr/>
-              </a:p>
-            </p:txBody>
-          </p:sp>
-        </p:grpSp>
-      </p:grpSp>
       <p:sp>
         <p:nvSpPr>
-          <p:cNvPr id="1074" name="Google Shape;1074;p36"/>
-          <p:cNvSpPr txBox="1">
+          <p:cNvPr id="3" name="Title 2">
+            <a:extLst>
+              <a:ext uri="{FF2B5EF4-FFF2-40B4-BE49-F238E27FC236}">
+                <a16:creationId xmlns:a16="http://schemas.microsoft.com/office/drawing/2014/main" id="{EA10763D-BC5F-0418-DB6F-FA9E06859A36}"/>
+              </a:ext>
+            </a:extLst>
+          </p:cNvPr>
+          <p:cNvSpPr>
             <a:spLocks noGrp="1"/>
           </p:cNvSpPr>
           <p:nvPr>
-            <p:ph type="title"/>
+            <p:ph type="ctrTitle"/>
           </p:nvPr>
         </p:nvSpPr>
         <p:spPr>
           <a:xfrm>
-            <a:off x="581925" y="3391646"/>
-            <a:ext cx="4126500" cy="1321200"/>
+            <a:off x="618824" y="411675"/>
+            <a:ext cx="6807887" cy="577800"/>
+          </a:xfrm>
+        </p:spPr>
+        <p:txBody>
+          <a:bodyPr/>
+          <a:lstStyle/>
+          <a:p>
+            <a:r>
+              <a:rPr lang="en-US" sz="2400" b="1" dirty="0"/>
+              <a:t>Seasonal monthly sales growth averaged by city</a:t>
+            </a:r>
+          </a:p>
+        </p:txBody>
+      </p:sp>
+      <p:pic>
+        <p:nvPicPr>
+          <p:cNvPr id="5" name="Picture 4" descr="A graph of different colored lines&#10;&#10;Description automatically generated">
+            <a:extLst>
+              <a:ext uri="{FF2B5EF4-FFF2-40B4-BE49-F238E27FC236}">
+                <a16:creationId xmlns:a16="http://schemas.microsoft.com/office/drawing/2014/main" id="{17582E37-35FD-50BE-47A1-128B38B30ADB}"/>
+              </a:ext>
+            </a:extLst>
+          </p:cNvPr>
+          <p:cNvPicPr>
+            <a:picLocks noChangeAspect="1"/>
+          </p:cNvPicPr>
+          <p:nvPr/>
+        </p:nvPicPr>
+        <p:blipFill>
+          <a:blip r:embed="rId2"/>
+          <a:stretch>
+            <a:fillRect/>
+          </a:stretch>
+        </p:blipFill>
+        <p:spPr>
+          <a:xfrm>
+            <a:off x="3546430" y="1145592"/>
+            <a:ext cx="5207120" cy="3094970"/>
           </a:xfrm>
           <a:prstGeom prst="rect">
             <a:avLst/>
           </a:prstGeom>
         </p:spPr>
+      </p:pic>
+      <p:sp>
+        <p:nvSpPr>
+          <p:cNvPr id="6" name="Text Placeholder 1">
+            <a:extLst>
+              <a:ext uri="{FF2B5EF4-FFF2-40B4-BE49-F238E27FC236}">
+                <a16:creationId xmlns:a16="http://schemas.microsoft.com/office/drawing/2014/main" id="{18B029ED-CD6A-34BE-C51D-3F799916C186}"/>
+              </a:ext>
+            </a:extLst>
+          </p:cNvPr>
+          <p:cNvSpPr>
+            <a:spLocks noGrp="1"/>
+          </p:cNvSpPr>
+          <p:nvPr>
+            <p:ph type="body" idx="1"/>
+          </p:nvPr>
+        </p:nvSpPr>
+        <p:spPr>
+          <a:xfrm>
+            <a:off x="93277" y="1082127"/>
+            <a:ext cx="3400771" cy="3326321"/>
+          </a:xfrm>
+        </p:spPr>
         <p:txBody>
-          <a:bodyPr spcFirstLastPara="1" wrap="square" lIns="91425" tIns="91425" rIns="91425" bIns="91425" anchor="b" anchorCtr="0">
-            <a:noAutofit/>
-          </a:bodyPr>
+          <a:bodyPr/>
           <a:lstStyle/>
           <a:p>
-            <a:pPr marL="0" lvl="0" indent="0" algn="l" rtl="0">
-              <a:spcBef>
-                <a:spcPts val="0"/>
-              </a:spcBef>
-              <a:spcAft>
-                <a:spcPts val="0"/>
-              </a:spcAft>
+            <a:r>
+              <a:rPr lang="en-US" sz="1400" dirty="0"/>
+              <a:t>The seasonal sales patterns for the Apple product show clear spikes around mid-year (June-July) and end-of-year (November-December) across all cities. </a:t>
+            </a:r>
+          </a:p>
+          <a:p>
+            <a:r>
+              <a:rPr lang="en-US" sz="1400" dirty="0"/>
+              <a:t>The mid-year increase is likely driven by educational purchases and mid-year promotions.</a:t>
+            </a:r>
+          </a:p>
+          <a:p>
+            <a:r>
+              <a:rPr lang="en-US" sz="1400" dirty="0"/>
+              <a:t>while the end-of-year surge is influenced by the holiday season and year-end bonuses. </a:t>
+            </a:r>
+          </a:p>
+          <a:p>
+            <a:r>
+              <a:rPr lang="en-US" sz="1400" dirty="0"/>
+              <a:t>City 4 consistently shows the highest sales, indicating a larger market or higher demand. </a:t>
+            </a:r>
+            <a:endParaRPr lang="en-US" sz="2000" dirty="0"/>
+          </a:p>
+          <a:p>
+            <a:pPr marL="114300" indent="0">
               <a:buNone/>
             </a:pPr>
+            <a:endParaRPr lang="en-US" sz="1600" dirty="0"/>
+          </a:p>
+          <a:p>
+            <a:endParaRPr lang="en-US" sz="1600" dirty="0"/>
+          </a:p>
+          <a:p>
+            <a:endParaRPr lang="en-US" sz="1600" dirty="0"/>
+          </a:p>
+          <a:p>
+            <a:endParaRPr lang="en-US" sz="1600" dirty="0"/>
+          </a:p>
+        </p:txBody>
+      </p:sp>
+    </p:spTree>
+    <p:extLst>
+      <p:ext uri="{BB962C8B-B14F-4D97-AF65-F5344CB8AC3E}">
+        <p14:creationId xmlns:p14="http://schemas.microsoft.com/office/powerpoint/2010/main" val="2719590631"/>
+      </p:ext>
+    </p:extLst>
+  </p:cSld>
+  <p:clrMapOvr>
+    <a:masterClrMapping/>
+  </p:clrMapOvr>
+</p:sld>
+</file>
+
+<file path=ppt/slides/slide9.xml><?xml version="1.0" encoding="utf-8"?>
+<p:sld xmlns:a="http://schemas.openxmlformats.org/drawingml/2006/main" xmlns:r="http://schemas.openxmlformats.org/officeDocument/2006/relationships" xmlns:p="http://schemas.openxmlformats.org/presentationml/2006/main">
+  <p:cSld>
+    <p:spTree>
+      <p:nvGrpSpPr>
+        <p:cNvPr id="1" name=""/>
+        <p:cNvGrpSpPr/>
+        <p:nvPr/>
+      </p:nvGrpSpPr>
+      <p:grpSpPr>
+        <a:xfrm>
+          <a:off x="0" y="0"/>
+          <a:ext cx="0" cy="0"/>
+          <a:chOff x="0" y="0"/>
+          <a:chExt cx="0" cy="0"/>
+        </a:xfrm>
+      </p:grpSpPr>
+      <p:sp>
+        <p:nvSpPr>
+          <p:cNvPr id="3" name="Title 2">
+            <a:extLst>
+              <a:ext uri="{FF2B5EF4-FFF2-40B4-BE49-F238E27FC236}">
+                <a16:creationId xmlns:a16="http://schemas.microsoft.com/office/drawing/2014/main" id="{EA10763D-BC5F-0418-DB6F-FA9E06859A36}"/>
+              </a:ext>
+            </a:extLst>
+          </p:cNvPr>
+          <p:cNvSpPr>
+            <a:spLocks noGrp="1"/>
+          </p:cNvSpPr>
+          <p:nvPr>
+            <p:ph type="ctrTitle"/>
+          </p:nvPr>
+        </p:nvSpPr>
+        <p:spPr>
+          <a:xfrm>
+            <a:off x="618824" y="411675"/>
+            <a:ext cx="6807887" cy="577800"/>
+          </a:xfrm>
+        </p:spPr>
+        <p:txBody>
+          <a:bodyPr/>
+          <a:lstStyle/>
+          <a:p>
             <a:r>
-              <a:rPr lang="en" strike="sngStrike" dirty="0"/>
-              <a:t>A</a:t>
+              <a:rPr lang="en-US" b="1" dirty="0"/>
+              <a:t>City-4 Unique Behavior </a:t>
             </a:r>
-            <a:r>
-              <a:rPr lang="en" dirty="0"/>
-              <a:t> </a:t>
-            </a:r>
-            <a:r>
-              <a:rPr lang="en" strike="sngStrike" dirty="0"/>
-              <a:t>Picture</a:t>
-            </a:r>
-            <a:r>
-              <a:rPr lang="en" dirty="0"/>
-              <a:t> Is Worth a Thousand Words</a:t>
-            </a:r>
-            <a:endParaRPr dirty="0"/>
           </a:p>
         </p:txBody>
       </p:sp>
       <p:sp>
         <p:nvSpPr>
-          <p:cNvPr id="2" name="Rectangle 1">
+          <p:cNvPr id="6" name="Text Placeholder 1">
             <a:extLst>
               <a:ext uri="{FF2B5EF4-FFF2-40B4-BE49-F238E27FC236}">
-                <a16:creationId xmlns:a16="http://schemas.microsoft.com/office/drawing/2014/main" id="{BE14A0EE-C90A-514F-9E33-49E8941689C4}"/>
+                <a16:creationId xmlns:a16="http://schemas.microsoft.com/office/drawing/2014/main" id="{18B029ED-CD6A-34BE-C51D-3F799916C186}"/>
+              </a:ext>
+            </a:extLst>
+          </p:cNvPr>
+          <p:cNvSpPr>
+            <a:spLocks noGrp="1"/>
+          </p:cNvSpPr>
+          <p:nvPr>
+            <p:ph type="body" idx="1"/>
+          </p:nvPr>
+        </p:nvSpPr>
+        <p:spPr>
+          <a:xfrm>
+            <a:off x="93277" y="1082128"/>
+            <a:ext cx="3400771" cy="2857040"/>
+          </a:xfrm>
+        </p:spPr>
+        <p:txBody>
+          <a:bodyPr/>
+          <a:lstStyle/>
+          <a:p>
+            <a:r>
+              <a:rPr lang="en-US" sz="1600" dirty="0"/>
+              <a:t>The pattern of City-4 is distinct compared to the rest of the cities.</a:t>
+            </a:r>
+          </a:p>
+          <a:p>
+            <a:r>
+              <a:rPr lang="en-US" sz="1600" dirty="0"/>
+              <a:t>The seasonal patterns and correlation for rest of the cities is far greater compared to City-4.</a:t>
+            </a:r>
+          </a:p>
+          <a:p>
+            <a:r>
+              <a:rPr lang="en-US" sz="1600" dirty="0"/>
+              <a:t>This indicates that the City-4 might have slightly different underlying factors influencing the Unit Sales .</a:t>
+            </a:r>
+          </a:p>
+          <a:p>
+            <a:r>
+              <a:rPr lang="en-US" sz="1600" dirty="0"/>
+              <a:t>City-4 is highly volatile when driven by discount.</a:t>
+            </a:r>
+          </a:p>
+          <a:p>
+            <a:endParaRPr lang="en-US" sz="1600" dirty="0"/>
+          </a:p>
+          <a:p>
+            <a:pPr marL="114300" indent="0">
+              <a:buNone/>
+            </a:pPr>
+            <a:endParaRPr lang="en-US" sz="1600" dirty="0"/>
+          </a:p>
+          <a:p>
+            <a:endParaRPr lang="en-US" sz="1600" dirty="0"/>
+          </a:p>
+          <a:p>
+            <a:endParaRPr lang="en-US" sz="1600" dirty="0"/>
+          </a:p>
+          <a:p>
+            <a:endParaRPr lang="en-US" sz="1600" dirty="0"/>
+          </a:p>
+        </p:txBody>
+      </p:sp>
+      <p:pic>
+        <p:nvPicPr>
+          <p:cNvPr id="4" name="Picture 3" descr="A graph with a line&#10;&#10;Description automatically generated">
+            <a:extLst>
+              <a:ext uri="{FF2B5EF4-FFF2-40B4-BE49-F238E27FC236}">
+                <a16:creationId xmlns:a16="http://schemas.microsoft.com/office/drawing/2014/main" id="{586E15EF-68C1-6D4A-76AF-7FEC6089849F}"/>
+              </a:ext>
+            </a:extLst>
+          </p:cNvPr>
+          <p:cNvPicPr>
+            <a:picLocks noChangeAspect="1"/>
+          </p:cNvPicPr>
+          <p:nvPr/>
+        </p:nvPicPr>
+        <p:blipFill>
+          <a:blip r:embed="rId2"/>
+          <a:stretch>
+            <a:fillRect/>
+          </a:stretch>
+        </p:blipFill>
+        <p:spPr>
+          <a:xfrm>
+            <a:off x="3494048" y="1811538"/>
+            <a:ext cx="5422126" cy="1674147"/>
+          </a:xfrm>
+          <a:prstGeom prst="rect">
+            <a:avLst/>
+          </a:prstGeom>
+        </p:spPr>
+      </p:pic>
+      <p:sp>
+        <p:nvSpPr>
+          <p:cNvPr id="7" name="TextBox 6">
+            <a:extLst>
+              <a:ext uri="{FF2B5EF4-FFF2-40B4-BE49-F238E27FC236}">
+                <a16:creationId xmlns:a16="http://schemas.microsoft.com/office/drawing/2014/main" id="{6E89FC9C-4F9B-EAD4-5EB5-264EA738F212}"/>
+              </a:ext>
+            </a:extLst>
+          </p:cNvPr>
+          <p:cNvSpPr txBox="1"/>
+          <p:nvPr/>
+        </p:nvSpPr>
+        <p:spPr>
+          <a:xfrm>
+            <a:off x="5434139" y="1564996"/>
+            <a:ext cx="652743" cy="307777"/>
+          </a:xfrm>
+          <a:prstGeom prst="rect">
+            <a:avLst/>
+          </a:prstGeom>
+          <a:noFill/>
+        </p:spPr>
+        <p:txBody>
+          <a:bodyPr wrap="none" rtlCol="0">
+            <a:spAutoFit/>
+          </a:bodyPr>
+          <a:lstStyle/>
+          <a:p>
+            <a:r>
+              <a:rPr lang="en-US" dirty="0">
+                <a:solidFill>
+                  <a:schemeClr val="bg1"/>
+                </a:solidFill>
+              </a:rPr>
+              <a:t>City-4</a:t>
+            </a:r>
+          </a:p>
+        </p:txBody>
+      </p:sp>
+      <p:sp>
+        <p:nvSpPr>
+          <p:cNvPr id="8" name="Rectangle 7">
+            <a:extLst>
+              <a:ext uri="{FF2B5EF4-FFF2-40B4-BE49-F238E27FC236}">
+                <a16:creationId xmlns:a16="http://schemas.microsoft.com/office/drawing/2014/main" id="{26DEA6B4-1877-1D99-F1C6-3B6A21AA3BB1}"/>
               </a:ext>
             </a:extLst>
           </p:cNvPr>
@@ -17690,41 +20289,154 @@
         </p:nvSpPr>
         <p:spPr>
           <a:xfrm>
-            <a:off x="391425" y="3386930"/>
-            <a:ext cx="1734675" cy="523220"/>
+            <a:off x="4720683" y="1657649"/>
+            <a:ext cx="493726" cy="1985083"/>
           </a:xfrm>
           <a:prstGeom prst="rect">
             <a:avLst/>
           </a:prstGeom>
           <a:noFill/>
+          <a:ln>
+            <a:solidFill>
+              <a:srgbClr val="FF0000"/>
+            </a:solidFill>
+          </a:ln>
         </p:spPr>
+        <p:style>
+          <a:lnRef idx="2">
+            <a:schemeClr val="accent1">
+              <a:shade val="50000"/>
+            </a:schemeClr>
+          </a:lnRef>
+          <a:fillRef idx="1">
+            <a:schemeClr val="accent1"/>
+          </a:fillRef>
+          <a:effectRef idx="0">
+            <a:schemeClr val="accent1"/>
+          </a:effectRef>
+          <a:fontRef idx="minor">
+            <a:schemeClr val="lt1"/>
+          </a:fontRef>
+        </p:style>
         <p:txBody>
-          <a:bodyPr wrap="square" lIns="91440" tIns="45720" rIns="91440" bIns="45720">
-            <a:spAutoFit/>
-          </a:bodyPr>
+          <a:bodyPr rtlCol="0" anchor="ctr"/>
           <a:lstStyle/>
           <a:p>
             <a:pPr algn="ctr"/>
-            <a:r>
-              <a:rPr lang="en-US" sz="2800" b="1" dirty="0">
-                <a:ln w="0"/>
-                <a:solidFill>
-                  <a:schemeClr val="accent1"/>
-                </a:solidFill>
-                <a:effectLst>
-                  <a:outerShdw blurRad="38100" dist="25400" dir="5400000" algn="ctr" rotWithShape="0">
-                    <a:srgbClr val="6E747A">
-                      <a:alpha val="43000"/>
-                    </a:srgbClr>
-                  </a:outerShdw>
-                </a:effectLst>
-              </a:rPr>
-              <a:t>DATA</a:t>
-            </a:r>
+            <a:endParaRPr lang="en-US"/>
+          </a:p>
+        </p:txBody>
+      </p:sp>
+      <p:sp>
+        <p:nvSpPr>
+          <p:cNvPr id="9" name="Rectangle 8">
+            <a:extLst>
+              <a:ext uri="{FF2B5EF4-FFF2-40B4-BE49-F238E27FC236}">
+                <a16:creationId xmlns:a16="http://schemas.microsoft.com/office/drawing/2014/main" id="{26A48CF8-73DA-35EC-ED1C-F7434BF11588}"/>
+              </a:ext>
+            </a:extLst>
+          </p:cNvPr>
+          <p:cNvSpPr/>
+          <p:nvPr/>
+        </p:nvSpPr>
+        <p:spPr>
+          <a:xfrm>
+            <a:off x="6037756" y="1656069"/>
+            <a:ext cx="493726" cy="1985083"/>
+          </a:xfrm>
+          <a:prstGeom prst="rect">
+            <a:avLst/>
+          </a:prstGeom>
+          <a:noFill/>
+          <a:ln>
+            <a:solidFill>
+              <a:srgbClr val="FF0000"/>
+            </a:solidFill>
+          </a:ln>
+        </p:spPr>
+        <p:style>
+          <a:lnRef idx="2">
+            <a:schemeClr val="accent1">
+              <a:shade val="50000"/>
+            </a:schemeClr>
+          </a:lnRef>
+          <a:fillRef idx="1">
+            <a:schemeClr val="accent1"/>
+          </a:fillRef>
+          <a:effectRef idx="0">
+            <a:schemeClr val="accent1"/>
+          </a:effectRef>
+          <a:fontRef idx="minor">
+            <a:schemeClr val="lt1"/>
+          </a:fontRef>
+        </p:style>
+        <p:txBody>
+          <a:bodyPr rtlCol="0" anchor="ctr"/>
+          <a:lstStyle/>
+          <a:p>
+            <a:pPr algn="ctr"/>
+            <a:endParaRPr lang="en-US"/>
+          </a:p>
+        </p:txBody>
+      </p:sp>
+      <p:sp>
+        <p:nvSpPr>
+          <p:cNvPr id="10" name="Rectangle 9">
+            <a:extLst>
+              <a:ext uri="{FF2B5EF4-FFF2-40B4-BE49-F238E27FC236}">
+                <a16:creationId xmlns:a16="http://schemas.microsoft.com/office/drawing/2014/main" id="{92670DA2-0492-A045-A786-E85AC815DA4A}"/>
+              </a:ext>
+            </a:extLst>
+          </p:cNvPr>
+          <p:cNvSpPr/>
+          <p:nvPr/>
+        </p:nvSpPr>
+        <p:spPr>
+          <a:xfrm>
+            <a:off x="7787268" y="1669358"/>
+            <a:ext cx="493726" cy="1985083"/>
+          </a:xfrm>
+          <a:prstGeom prst="rect">
+            <a:avLst/>
+          </a:prstGeom>
+          <a:noFill/>
+          <a:ln>
+            <a:solidFill>
+              <a:srgbClr val="FF0000"/>
+            </a:solidFill>
+          </a:ln>
+        </p:spPr>
+        <p:style>
+          <a:lnRef idx="2">
+            <a:schemeClr val="accent1">
+              <a:shade val="50000"/>
+            </a:schemeClr>
+          </a:lnRef>
+          <a:fillRef idx="1">
+            <a:schemeClr val="accent1"/>
+          </a:fillRef>
+          <a:effectRef idx="0">
+            <a:schemeClr val="accent1"/>
+          </a:effectRef>
+          <a:fontRef idx="minor">
+            <a:schemeClr val="lt1"/>
+          </a:fontRef>
+        </p:style>
+        <p:txBody>
+          <a:bodyPr rtlCol="0" anchor="ctr"/>
+          <a:lstStyle/>
+          <a:p>
+            <a:pPr algn="ctr"/>
+            <a:endParaRPr lang="en-US"/>
           </a:p>
         </p:txBody>
       </p:sp>
     </p:spTree>
+    <p:extLst>
+      <p:ext uri="{BB962C8B-B14F-4D97-AF65-F5344CB8AC3E}">
+        <p14:creationId xmlns:p14="http://schemas.microsoft.com/office/powerpoint/2010/main" val="2562737357"/>
+      </p:ext>
+    </p:extLst>
   </p:cSld>
   <p:clrMapOvr>
     <a:masterClrMapping/>

</xml_diff>